<commit_message>
made more edits to pptx and report
</commit_message>
<xml_diff>
--- a/docs/tools_presentation.pptx
+++ b/docs/tools_presentation.pptx
@@ -6,34 +6,33 @@
     <p:sldMasterId id="2147483660" r:id="rId2"/>
   </p:sldMasterIdLst>
   <p:notesMasterIdLst>
-    <p:notesMasterId r:id="rId28"/>
+    <p:notesMasterId r:id="rId27"/>
   </p:notesMasterIdLst>
   <p:sldIdLst>
     <p:sldId id="256" r:id="rId3"/>
     <p:sldId id="570" r:id="rId4"/>
     <p:sldId id="571" r:id="rId5"/>
     <p:sldId id="572" r:id="rId6"/>
-    <p:sldId id="573" r:id="rId7"/>
-    <p:sldId id="574" r:id="rId8"/>
-    <p:sldId id="575" r:id="rId9"/>
-    <p:sldId id="576" r:id="rId10"/>
-    <p:sldId id="577" r:id="rId11"/>
-    <p:sldId id="578" r:id="rId12"/>
-    <p:sldId id="579" r:id="rId13"/>
-    <p:sldId id="287" r:id="rId14"/>
-    <p:sldId id="569" r:id="rId15"/>
-    <p:sldId id="554" r:id="rId16"/>
-    <p:sldId id="555" r:id="rId17"/>
-    <p:sldId id="557" r:id="rId18"/>
-    <p:sldId id="553" r:id="rId19"/>
-    <p:sldId id="558" r:id="rId20"/>
-    <p:sldId id="559" r:id="rId21"/>
-    <p:sldId id="560" r:id="rId22"/>
-    <p:sldId id="563" r:id="rId23"/>
-    <p:sldId id="564" r:id="rId24"/>
-    <p:sldId id="566" r:id="rId25"/>
-    <p:sldId id="568" r:id="rId26"/>
-    <p:sldId id="567" r:id="rId27"/>
+    <p:sldId id="574" r:id="rId7"/>
+    <p:sldId id="575" r:id="rId8"/>
+    <p:sldId id="576" r:id="rId9"/>
+    <p:sldId id="577" r:id="rId10"/>
+    <p:sldId id="578" r:id="rId11"/>
+    <p:sldId id="579" r:id="rId12"/>
+    <p:sldId id="287" r:id="rId13"/>
+    <p:sldId id="569" r:id="rId14"/>
+    <p:sldId id="554" r:id="rId15"/>
+    <p:sldId id="555" r:id="rId16"/>
+    <p:sldId id="557" r:id="rId17"/>
+    <p:sldId id="553" r:id="rId18"/>
+    <p:sldId id="558" r:id="rId19"/>
+    <p:sldId id="559" r:id="rId20"/>
+    <p:sldId id="560" r:id="rId21"/>
+    <p:sldId id="563" r:id="rId22"/>
+    <p:sldId id="564" r:id="rId23"/>
+    <p:sldId id="566" r:id="rId24"/>
+    <p:sldId id="568" r:id="rId25"/>
+    <p:sldId id="567" r:id="rId26"/>
   </p:sldIdLst>
   <p:sldSz cx="12192000" cy="6858000"/>
   <p:notesSz cx="6858000" cy="9144000"/>
@@ -601,150 +600,6 @@
         <p:cNvPr id="1" name="Shape 159">
           <a:extLst>
             <a:ext uri="{FF2B5EF4-FFF2-40B4-BE49-F238E27FC236}">
-              <a16:creationId xmlns:a16="http://schemas.microsoft.com/office/drawing/2014/main" id="{2B133D30-E3FF-D278-5E3A-71CB6A1512F5}"/>
-            </a:ext>
-          </a:extLst>
-        </p:cNvPr>
-        <p:cNvGrpSpPr/>
-        <p:nvPr/>
-      </p:nvGrpSpPr>
-      <p:grpSpPr>
-        <a:xfrm>
-          <a:off x="0" y="0"/>
-          <a:ext cx="0" cy="0"/>
-          <a:chOff x="0" y="0"/>
-          <a:chExt cx="0" cy="0"/>
-        </a:xfrm>
-      </p:grpSpPr>
-      <p:sp>
-        <p:nvSpPr>
-          <p:cNvPr id="160" name="Google Shape;160;g2f426c55b76_0_11:notes">
-            <a:extLst>
-              <a:ext uri="{FF2B5EF4-FFF2-40B4-BE49-F238E27FC236}">
-                <a16:creationId xmlns:a16="http://schemas.microsoft.com/office/drawing/2014/main" id="{66A03202-B060-4079-129F-9EEAA9A3120F}"/>
-              </a:ext>
-            </a:extLst>
-          </p:cNvPr>
-          <p:cNvSpPr>
-            <a:spLocks noGrp="1" noRot="1" noChangeAspect="1"/>
-          </p:cNvSpPr>
-          <p:nvPr>
-            <p:ph type="sldImg" idx="2"/>
-          </p:nvPr>
-        </p:nvSpPr>
-        <p:spPr>
-          <a:xfrm>
-            <a:off x="381000" y="685800"/>
-            <a:ext cx="6096000" cy="3429000"/>
-          </a:xfrm>
-          <a:custGeom>
-            <a:avLst/>
-            <a:gdLst/>
-            <a:ahLst/>
-            <a:cxnLst/>
-            <a:rect l="l" t="t" r="r" b="b"/>
-            <a:pathLst>
-              <a:path w="120000" h="120000" extrusionOk="0">
-                <a:moveTo>
-                  <a:pt x="0" y="0"/>
-                </a:moveTo>
-                <a:lnTo>
-                  <a:pt x="120000" y="0"/>
-                </a:lnTo>
-                <a:lnTo>
-                  <a:pt x="120000" y="120000"/>
-                </a:lnTo>
-                <a:lnTo>
-                  <a:pt x="0" y="120000"/>
-                </a:lnTo>
-                <a:close/>
-              </a:path>
-            </a:pathLst>
-          </a:custGeom>
-        </p:spPr>
-      </p:sp>
-      <p:sp>
-        <p:nvSpPr>
-          <p:cNvPr id="161" name="Google Shape;161;g2f426c55b76_0_11:notes">
-            <a:extLst>
-              <a:ext uri="{FF2B5EF4-FFF2-40B4-BE49-F238E27FC236}">
-                <a16:creationId xmlns:a16="http://schemas.microsoft.com/office/drawing/2014/main" id="{08D81A5D-7615-48E5-9B96-052FF241443F}"/>
-              </a:ext>
-            </a:extLst>
-          </p:cNvPr>
-          <p:cNvSpPr txBox="1">
-            <a:spLocks noGrp="1"/>
-          </p:cNvSpPr>
-          <p:nvPr>
-            <p:ph type="body" idx="1"/>
-          </p:nvPr>
-        </p:nvSpPr>
-        <p:spPr>
-          <a:xfrm>
-            <a:off x="685800" y="4343400"/>
-            <a:ext cx="5486400" cy="4114800"/>
-          </a:xfrm>
-          <a:prstGeom prst="rect">
-            <a:avLst/>
-          </a:prstGeom>
-        </p:spPr>
-        <p:txBody>
-          <a:bodyPr spcFirstLastPara="1" wrap="square" lIns="91425" tIns="91425" rIns="91425" bIns="91425" anchor="t" anchorCtr="0">
-            <a:noAutofit/>
-          </a:bodyPr>
-          <a:lstStyle/>
-          <a:p>
-            <a:pPr marL="285750" lvl="0" indent="-285750" algn="l" rtl="0">
-              <a:spcBef>
-                <a:spcPts val="600"/>
-              </a:spcBef>
-              <a:spcAft>
-                <a:spcPts val="0"/>
-              </a:spcAft>
-              <a:buFont typeface="Arial" panose="020B0604020202020204" pitchFamily="34" charset="0"/>
-              <a:buChar char="•"/>
-            </a:pPr>
-            <a:r>
-              <a:rPr lang="en-US" b="1" dirty="0"/>
-              <a:t>Takeaway:</a:t>
-            </a:r>
-            <a:r>
-              <a:rPr lang="en-US" dirty="0"/>
-              <a:t> intermediate strides (S=4 or S=8) balance speed and accuracy.</a:t>
-            </a:r>
-            <a:endParaRPr sz="1200" dirty="0">
-              <a:solidFill>
-                <a:schemeClr val="dk1"/>
-              </a:solidFill>
-              <a:latin typeface="Lato"/>
-              <a:ea typeface="Lato"/>
-              <a:cs typeface="Lato"/>
-              <a:sym typeface="Lato"/>
-            </a:endParaRPr>
-          </a:p>
-        </p:txBody>
-      </p:sp>
-    </p:spTree>
-    <p:extLst>
-      <p:ext uri="{BB962C8B-B14F-4D97-AF65-F5344CB8AC3E}">
-        <p14:creationId xmlns:p14="http://schemas.microsoft.com/office/powerpoint/2010/main" val="3472115502"/>
-      </p:ext>
-    </p:extLst>
-  </p:cSld>
-  <p:clrMapOvr>
-    <a:masterClrMapping/>
-  </p:clrMapOvr>
-</p:notes>
-</file>
-
-<file path=ppt/notesSlides/notesSlide11.xml><?xml version="1.0" encoding="utf-8"?>
-<p:notes xmlns:a="http://schemas.openxmlformats.org/drawingml/2006/main" xmlns:r="http://schemas.openxmlformats.org/officeDocument/2006/relationships" xmlns:p="http://schemas.openxmlformats.org/presentationml/2006/main" showMasterSp="0" showMasterPhAnim="0">
-  <p:cSld>
-    <p:spTree>
-      <p:nvGrpSpPr>
-        <p:cNvPr id="1" name="Shape 159">
-          <a:extLst>
-            <a:ext uri="{FF2B5EF4-FFF2-40B4-BE49-F238E27FC236}">
               <a16:creationId xmlns:a16="http://schemas.microsoft.com/office/drawing/2014/main" id="{A987D5E8-D331-5388-AFDE-E0A813703101}"/>
             </a:ext>
           </a:extLst>
@@ -873,7 +728,7 @@
 </p:notes>
 </file>
 
-<file path=ppt/notesSlides/notesSlide12.xml><?xml version="1.0" encoding="utf-8"?>
+<file path=ppt/notesSlides/notesSlide11.xml><?xml version="1.0" encoding="utf-8"?>
 <p:notes xmlns:a="http://schemas.openxmlformats.org/drawingml/2006/main" xmlns:r="http://schemas.openxmlformats.org/officeDocument/2006/relationships" xmlns:p="http://schemas.openxmlformats.org/presentationml/2006/main" showMasterSp="0" showMasterPhAnim="0">
   <p:cSld>
     <p:spTree>
@@ -982,7 +837,7 @@
 </p:notes>
 </file>
 
-<file path=ppt/notesSlides/notesSlide13.xml><?xml version="1.0" encoding="utf-8"?>
+<file path=ppt/notesSlides/notesSlide12.xml><?xml version="1.0" encoding="utf-8"?>
 <p:notes xmlns:a="http://schemas.openxmlformats.org/drawingml/2006/main" xmlns:r="http://schemas.openxmlformats.org/officeDocument/2006/relationships" xmlns:p="http://schemas.openxmlformats.org/presentationml/2006/main" showMasterSp="0" showMasterPhAnim="0">
   <p:cSld>
     <p:spTree>
@@ -1118,7 +973,7 @@
 </p:notes>
 </file>
 
-<file path=ppt/notesSlides/notesSlide14.xml><?xml version="1.0" encoding="utf-8"?>
+<file path=ppt/notesSlides/notesSlide13.xml><?xml version="1.0" encoding="utf-8"?>
 <p:notes xmlns:a="http://schemas.openxmlformats.org/drawingml/2006/main" xmlns:r="http://schemas.openxmlformats.org/officeDocument/2006/relationships" xmlns:p="http://schemas.openxmlformats.org/presentationml/2006/main" showMasterSp="0" showMasterPhAnim="0">
   <p:cSld>
     <p:spTree>
@@ -1254,7 +1109,7 @@
 </p:notes>
 </file>
 
-<file path=ppt/notesSlides/notesSlide15.xml><?xml version="1.0" encoding="utf-8"?>
+<file path=ppt/notesSlides/notesSlide14.xml><?xml version="1.0" encoding="utf-8"?>
 <p:notes xmlns:a="http://schemas.openxmlformats.org/drawingml/2006/main" xmlns:r="http://schemas.openxmlformats.org/officeDocument/2006/relationships" xmlns:p="http://schemas.openxmlformats.org/presentationml/2006/main" showMasterSp="0" showMasterPhAnim="0">
   <p:cSld>
     <p:spTree>
@@ -1390,7 +1245,7 @@
 </p:notes>
 </file>
 
-<file path=ppt/notesSlides/notesSlide16.xml><?xml version="1.0" encoding="utf-8"?>
+<file path=ppt/notesSlides/notesSlide15.xml><?xml version="1.0" encoding="utf-8"?>
 <p:notes xmlns:a="http://schemas.openxmlformats.org/drawingml/2006/main" xmlns:r="http://schemas.openxmlformats.org/officeDocument/2006/relationships" xmlns:p="http://schemas.openxmlformats.org/presentationml/2006/main" showMasterSp="0" showMasterPhAnim="0">
   <p:cSld>
     <p:spTree>
@@ -1663,7 +1518,7 @@
 </p:notes>
 </file>
 
-<file path=ppt/notesSlides/notesSlide17.xml><?xml version="1.0" encoding="utf-8"?>
+<file path=ppt/notesSlides/notesSlide16.xml><?xml version="1.0" encoding="utf-8"?>
 <p:notes xmlns:a="http://schemas.openxmlformats.org/drawingml/2006/main" xmlns:r="http://schemas.openxmlformats.org/officeDocument/2006/relationships" xmlns:p="http://schemas.openxmlformats.org/presentationml/2006/main" showMasterSp="0" showMasterPhAnim="0">
   <p:cSld>
     <p:spTree>
@@ -1899,7 +1754,7 @@
 </p:notes>
 </file>
 
-<file path=ppt/notesSlides/notesSlide18.xml><?xml version="1.0" encoding="utf-8"?>
+<file path=ppt/notesSlides/notesSlide17.xml><?xml version="1.0" encoding="utf-8"?>
 <p:notes xmlns:a="http://schemas.openxmlformats.org/drawingml/2006/main" xmlns:r="http://schemas.openxmlformats.org/officeDocument/2006/relationships" xmlns:p="http://schemas.openxmlformats.org/presentationml/2006/main" showMasterSp="0" showMasterPhAnim="0">
   <p:cSld>
     <p:spTree>
@@ -2021,7 +1876,7 @@
 </p:notes>
 </file>
 
-<file path=ppt/notesSlides/notesSlide19.xml><?xml version="1.0" encoding="utf-8"?>
+<file path=ppt/notesSlides/notesSlide18.xml><?xml version="1.0" encoding="utf-8"?>
 <p:notes xmlns:a="http://schemas.openxmlformats.org/drawingml/2006/main" xmlns:r="http://schemas.openxmlformats.org/officeDocument/2006/relationships" xmlns:p="http://schemas.openxmlformats.org/presentationml/2006/main" showMasterSp="0" showMasterPhAnim="0">
   <p:cSld>
     <p:spTree>
@@ -2133,6 +1988,178 @@
     <p:extLst>
       <p:ext uri="{BB962C8B-B14F-4D97-AF65-F5344CB8AC3E}">
         <p14:creationId xmlns:p14="http://schemas.microsoft.com/office/powerpoint/2010/main" val="2210477092"/>
+      </p:ext>
+    </p:extLst>
+  </p:cSld>
+  <p:clrMapOvr>
+    <a:masterClrMapping/>
+  </p:clrMapOvr>
+</p:notes>
+</file>
+
+<file path=ppt/notesSlides/notesSlide19.xml><?xml version="1.0" encoding="utf-8"?>
+<p:notes xmlns:a="http://schemas.openxmlformats.org/drawingml/2006/main" xmlns:r="http://schemas.openxmlformats.org/officeDocument/2006/relationships" xmlns:p="http://schemas.openxmlformats.org/presentationml/2006/main" showMasterSp="0" showMasterPhAnim="0">
+  <p:cSld>
+    <p:spTree>
+      <p:nvGrpSpPr>
+        <p:cNvPr id="1" name="Shape 159">
+          <a:extLst>
+            <a:ext uri="{FF2B5EF4-FFF2-40B4-BE49-F238E27FC236}">
+              <a16:creationId xmlns:a16="http://schemas.microsoft.com/office/drawing/2014/main" id="{B2CC9266-95BB-1AC0-3E54-149091F3A00E}"/>
+            </a:ext>
+          </a:extLst>
+        </p:cNvPr>
+        <p:cNvGrpSpPr/>
+        <p:nvPr/>
+      </p:nvGrpSpPr>
+      <p:grpSpPr>
+        <a:xfrm>
+          <a:off x="0" y="0"/>
+          <a:ext cx="0" cy="0"/>
+          <a:chOff x="0" y="0"/>
+          <a:chExt cx="0" cy="0"/>
+        </a:xfrm>
+      </p:grpSpPr>
+      <p:sp>
+        <p:nvSpPr>
+          <p:cNvPr id="160" name="Google Shape;160;g2f426c55b76_0_11:notes">
+            <a:extLst>
+              <a:ext uri="{FF2B5EF4-FFF2-40B4-BE49-F238E27FC236}">
+                <a16:creationId xmlns:a16="http://schemas.microsoft.com/office/drawing/2014/main" id="{29FB8164-7442-2B6D-AF10-0272D878F298}"/>
+              </a:ext>
+            </a:extLst>
+          </p:cNvPr>
+          <p:cNvSpPr>
+            <a:spLocks noGrp="1" noRot="1" noChangeAspect="1"/>
+          </p:cNvSpPr>
+          <p:nvPr>
+            <p:ph type="sldImg" idx="2"/>
+          </p:nvPr>
+        </p:nvSpPr>
+        <p:spPr>
+          <a:xfrm>
+            <a:off x="381000" y="685800"/>
+            <a:ext cx="6096000" cy="3429000"/>
+          </a:xfrm>
+          <a:custGeom>
+            <a:avLst/>
+            <a:gdLst/>
+            <a:ahLst/>
+            <a:cxnLst/>
+            <a:rect l="l" t="t" r="r" b="b"/>
+            <a:pathLst>
+              <a:path w="120000" h="120000" extrusionOk="0">
+                <a:moveTo>
+                  <a:pt x="0" y="0"/>
+                </a:moveTo>
+                <a:lnTo>
+                  <a:pt x="120000" y="0"/>
+                </a:lnTo>
+                <a:lnTo>
+                  <a:pt x="120000" y="120000"/>
+                </a:lnTo>
+                <a:lnTo>
+                  <a:pt x="0" y="120000"/>
+                </a:lnTo>
+                <a:close/>
+              </a:path>
+            </a:pathLst>
+          </a:custGeom>
+        </p:spPr>
+      </p:sp>
+      <p:sp>
+        <p:nvSpPr>
+          <p:cNvPr id="161" name="Google Shape;161;g2f426c55b76_0_11:notes">
+            <a:extLst>
+              <a:ext uri="{FF2B5EF4-FFF2-40B4-BE49-F238E27FC236}">
+                <a16:creationId xmlns:a16="http://schemas.microsoft.com/office/drawing/2014/main" id="{42FA8D93-1975-0583-BCCD-FA0D65516404}"/>
+              </a:ext>
+            </a:extLst>
+          </p:cNvPr>
+          <p:cNvSpPr txBox="1">
+            <a:spLocks noGrp="1"/>
+          </p:cNvSpPr>
+          <p:nvPr>
+            <p:ph type="body" idx="1"/>
+          </p:nvPr>
+        </p:nvSpPr>
+        <p:spPr>
+          <a:xfrm>
+            <a:off x="685800" y="4343400"/>
+            <a:ext cx="5486400" cy="4114800"/>
+          </a:xfrm>
+          <a:prstGeom prst="rect">
+            <a:avLst/>
+          </a:prstGeom>
+        </p:spPr>
+        <p:txBody>
+          <a:bodyPr spcFirstLastPara="1" wrap="square" lIns="91425" tIns="91425" rIns="91425" bIns="91425" anchor="t" anchorCtr="0">
+            <a:noAutofit/>
+          </a:bodyPr>
+          <a:lstStyle/>
+          <a:p>
+            <a:pPr marL="285750" lvl="0" indent="-285750" algn="l" rtl="0">
+              <a:spcBef>
+                <a:spcPts val="600"/>
+              </a:spcBef>
+              <a:spcAft>
+                <a:spcPts val="0"/>
+              </a:spcAft>
+              <a:buFont typeface="Arial" panose="020B0604020202020204" pitchFamily="34" charset="0"/>
+              <a:buChar char="•"/>
+            </a:pPr>
+            <a:r>
+              <a:rPr lang="en-US" sz="1200" dirty="0">
+                <a:solidFill>
+                  <a:schemeClr val="dk1"/>
+                </a:solidFill>
+                <a:latin typeface="Lato"/>
+                <a:ea typeface="Lato"/>
+                <a:cs typeface="Lato"/>
+                <a:sym typeface="Lato"/>
+              </a:rPr>
+              <a:t>This is with a different set of code so don’t worry about the previous numbers for timings.. We are not comparing performance from baseline since the code is not the exact same… I am calling a bunch of </a:t>
+            </a:r>
+            <a:r>
+              <a:rPr lang="en-US" sz="1200" dirty="0" err="1">
+                <a:solidFill>
+                  <a:schemeClr val="dk1"/>
+                </a:solidFill>
+                <a:latin typeface="Lato"/>
+                <a:ea typeface="Lato"/>
+                <a:cs typeface="Lato"/>
+                <a:sym typeface="Lato"/>
+              </a:rPr>
+              <a:t>fthings</a:t>
+            </a:r>
+            <a:r>
+              <a:rPr lang="en-US" sz="1200" dirty="0">
+                <a:solidFill>
+                  <a:schemeClr val="dk1"/>
+                </a:solidFill>
+                <a:latin typeface="Lato"/>
+                <a:ea typeface="Lato"/>
+                <a:cs typeface="Lato"/>
+                <a:sym typeface="Lato"/>
+              </a:rPr>
+              <a:t> in the new script not just once like the first example script. That was just a baseline thing. </a:t>
+            </a:r>
+            <a:endParaRPr sz="1200" dirty="0">
+              <a:solidFill>
+                <a:schemeClr val="dk1"/>
+              </a:solidFill>
+              <a:latin typeface="Lato"/>
+              <a:ea typeface="Lato"/>
+              <a:cs typeface="Lato"/>
+              <a:sym typeface="Lato"/>
+            </a:endParaRPr>
+          </a:p>
+        </p:txBody>
+      </p:sp>
+    </p:spTree>
+    <p:extLst>
+      <p:ext uri="{BB962C8B-B14F-4D97-AF65-F5344CB8AC3E}">
+        <p14:creationId xmlns:p14="http://schemas.microsoft.com/office/powerpoint/2010/main" val="1222298727"/>
       </p:ext>
     </p:extLst>
   </p:cSld>
@@ -2286,178 +2313,6 @@
         <p:cNvPr id="1" name="Shape 159">
           <a:extLst>
             <a:ext uri="{FF2B5EF4-FFF2-40B4-BE49-F238E27FC236}">
-              <a16:creationId xmlns:a16="http://schemas.microsoft.com/office/drawing/2014/main" id="{B2CC9266-95BB-1AC0-3E54-149091F3A00E}"/>
-            </a:ext>
-          </a:extLst>
-        </p:cNvPr>
-        <p:cNvGrpSpPr/>
-        <p:nvPr/>
-      </p:nvGrpSpPr>
-      <p:grpSpPr>
-        <a:xfrm>
-          <a:off x="0" y="0"/>
-          <a:ext cx="0" cy="0"/>
-          <a:chOff x="0" y="0"/>
-          <a:chExt cx="0" cy="0"/>
-        </a:xfrm>
-      </p:grpSpPr>
-      <p:sp>
-        <p:nvSpPr>
-          <p:cNvPr id="160" name="Google Shape;160;g2f426c55b76_0_11:notes">
-            <a:extLst>
-              <a:ext uri="{FF2B5EF4-FFF2-40B4-BE49-F238E27FC236}">
-                <a16:creationId xmlns:a16="http://schemas.microsoft.com/office/drawing/2014/main" id="{29FB8164-7442-2B6D-AF10-0272D878F298}"/>
-              </a:ext>
-            </a:extLst>
-          </p:cNvPr>
-          <p:cNvSpPr>
-            <a:spLocks noGrp="1" noRot="1" noChangeAspect="1"/>
-          </p:cNvSpPr>
-          <p:nvPr>
-            <p:ph type="sldImg" idx="2"/>
-          </p:nvPr>
-        </p:nvSpPr>
-        <p:spPr>
-          <a:xfrm>
-            <a:off x="381000" y="685800"/>
-            <a:ext cx="6096000" cy="3429000"/>
-          </a:xfrm>
-          <a:custGeom>
-            <a:avLst/>
-            <a:gdLst/>
-            <a:ahLst/>
-            <a:cxnLst/>
-            <a:rect l="l" t="t" r="r" b="b"/>
-            <a:pathLst>
-              <a:path w="120000" h="120000" extrusionOk="0">
-                <a:moveTo>
-                  <a:pt x="0" y="0"/>
-                </a:moveTo>
-                <a:lnTo>
-                  <a:pt x="120000" y="0"/>
-                </a:lnTo>
-                <a:lnTo>
-                  <a:pt x="120000" y="120000"/>
-                </a:lnTo>
-                <a:lnTo>
-                  <a:pt x="0" y="120000"/>
-                </a:lnTo>
-                <a:close/>
-              </a:path>
-            </a:pathLst>
-          </a:custGeom>
-        </p:spPr>
-      </p:sp>
-      <p:sp>
-        <p:nvSpPr>
-          <p:cNvPr id="161" name="Google Shape;161;g2f426c55b76_0_11:notes">
-            <a:extLst>
-              <a:ext uri="{FF2B5EF4-FFF2-40B4-BE49-F238E27FC236}">
-                <a16:creationId xmlns:a16="http://schemas.microsoft.com/office/drawing/2014/main" id="{42FA8D93-1975-0583-BCCD-FA0D65516404}"/>
-              </a:ext>
-            </a:extLst>
-          </p:cNvPr>
-          <p:cNvSpPr txBox="1">
-            <a:spLocks noGrp="1"/>
-          </p:cNvSpPr>
-          <p:nvPr>
-            <p:ph type="body" idx="1"/>
-          </p:nvPr>
-        </p:nvSpPr>
-        <p:spPr>
-          <a:xfrm>
-            <a:off x="685800" y="4343400"/>
-            <a:ext cx="5486400" cy="4114800"/>
-          </a:xfrm>
-          <a:prstGeom prst="rect">
-            <a:avLst/>
-          </a:prstGeom>
-        </p:spPr>
-        <p:txBody>
-          <a:bodyPr spcFirstLastPara="1" wrap="square" lIns="91425" tIns="91425" rIns="91425" bIns="91425" anchor="t" anchorCtr="0">
-            <a:noAutofit/>
-          </a:bodyPr>
-          <a:lstStyle/>
-          <a:p>
-            <a:pPr marL="285750" lvl="0" indent="-285750" algn="l" rtl="0">
-              <a:spcBef>
-                <a:spcPts val="600"/>
-              </a:spcBef>
-              <a:spcAft>
-                <a:spcPts val="0"/>
-              </a:spcAft>
-              <a:buFont typeface="Arial" panose="020B0604020202020204" pitchFamily="34" charset="0"/>
-              <a:buChar char="•"/>
-            </a:pPr>
-            <a:r>
-              <a:rPr lang="en-US" sz="1200" dirty="0">
-                <a:solidFill>
-                  <a:schemeClr val="dk1"/>
-                </a:solidFill>
-                <a:latin typeface="Lato"/>
-                <a:ea typeface="Lato"/>
-                <a:cs typeface="Lato"/>
-                <a:sym typeface="Lato"/>
-              </a:rPr>
-              <a:t>This is with a different set of code so don’t worry about the previous numbers for timings.. We are not comparing performance from baseline since the code is not the exact same… I am calling a bunch of </a:t>
-            </a:r>
-            <a:r>
-              <a:rPr lang="en-US" sz="1200" dirty="0" err="1">
-                <a:solidFill>
-                  <a:schemeClr val="dk1"/>
-                </a:solidFill>
-                <a:latin typeface="Lato"/>
-                <a:ea typeface="Lato"/>
-                <a:cs typeface="Lato"/>
-                <a:sym typeface="Lato"/>
-              </a:rPr>
-              <a:t>fthings</a:t>
-            </a:r>
-            <a:r>
-              <a:rPr lang="en-US" sz="1200" dirty="0">
-                <a:solidFill>
-                  <a:schemeClr val="dk1"/>
-                </a:solidFill>
-                <a:latin typeface="Lato"/>
-                <a:ea typeface="Lato"/>
-                <a:cs typeface="Lato"/>
-                <a:sym typeface="Lato"/>
-              </a:rPr>
-              <a:t> in the new script not just once like the first example script. That was just a baseline thing. </a:t>
-            </a:r>
-            <a:endParaRPr sz="1200" dirty="0">
-              <a:solidFill>
-                <a:schemeClr val="dk1"/>
-              </a:solidFill>
-              <a:latin typeface="Lato"/>
-              <a:ea typeface="Lato"/>
-              <a:cs typeface="Lato"/>
-              <a:sym typeface="Lato"/>
-            </a:endParaRPr>
-          </a:p>
-        </p:txBody>
-      </p:sp>
-    </p:spTree>
-    <p:extLst>
-      <p:ext uri="{BB962C8B-B14F-4D97-AF65-F5344CB8AC3E}">
-        <p14:creationId xmlns:p14="http://schemas.microsoft.com/office/powerpoint/2010/main" val="1222298727"/>
-      </p:ext>
-    </p:extLst>
-  </p:cSld>
-  <p:clrMapOvr>
-    <a:masterClrMapping/>
-  </p:clrMapOvr>
-</p:notes>
-</file>
-
-<file path=ppt/notesSlides/notesSlide21.xml><?xml version="1.0" encoding="utf-8"?>
-<p:notes xmlns:a="http://schemas.openxmlformats.org/drawingml/2006/main" xmlns:r="http://schemas.openxmlformats.org/officeDocument/2006/relationships" xmlns:p="http://schemas.openxmlformats.org/presentationml/2006/main" showMasterSp="0" showMasterPhAnim="0">
-  <p:cSld>
-    <p:spTree>
-      <p:nvGrpSpPr>
-        <p:cNvPr id="1" name="Shape 159">
-          <a:extLst>
-            <a:ext uri="{FF2B5EF4-FFF2-40B4-BE49-F238E27FC236}">
               <a16:creationId xmlns:a16="http://schemas.microsoft.com/office/drawing/2014/main" id="{D590D088-D4E9-DA7B-C2F9-ADBA011F9AC7}"/>
             </a:ext>
           </a:extLst>
@@ -2622,7 +2477,7 @@
 </p:notes>
 </file>
 
-<file path=ppt/notesSlides/notesSlide22.xml><?xml version="1.0" encoding="utf-8"?>
+<file path=ppt/notesSlides/notesSlide21.xml><?xml version="1.0" encoding="utf-8"?>
 <p:notes xmlns:a="http://schemas.openxmlformats.org/drawingml/2006/main" xmlns:r="http://schemas.openxmlformats.org/officeDocument/2006/relationships" xmlns:p="http://schemas.openxmlformats.org/presentationml/2006/main" showMasterSp="0" showMasterPhAnim="0">
   <p:cSld>
     <p:spTree>
@@ -2813,7 +2668,7 @@
 </p:notes>
 </file>
 
-<file path=ppt/notesSlides/notesSlide23.xml><?xml version="1.0" encoding="utf-8"?>
+<file path=ppt/notesSlides/notesSlide22.xml><?xml version="1.0" encoding="utf-8"?>
 <p:notes xmlns:a="http://schemas.openxmlformats.org/drawingml/2006/main" xmlns:r="http://schemas.openxmlformats.org/officeDocument/2006/relationships" xmlns:p="http://schemas.openxmlformats.org/presentationml/2006/main" showMasterSp="0" showMasterPhAnim="0">
   <p:cSld>
     <p:spTree>
@@ -2988,7 +2843,7 @@
 </p:notes>
 </file>
 
-<file path=ppt/notesSlides/notesSlide24.xml><?xml version="1.0" encoding="utf-8"?>
+<file path=ppt/notesSlides/notesSlide23.xml><?xml version="1.0" encoding="utf-8"?>
 <p:notes xmlns:a="http://schemas.openxmlformats.org/drawingml/2006/main" xmlns:r="http://schemas.openxmlformats.org/officeDocument/2006/relationships" xmlns:p="http://schemas.openxmlformats.org/presentationml/2006/main" showMasterSp="0" showMasterPhAnim="0">
   <p:cSld>
     <p:spTree>
@@ -3404,142 +3259,6 @@
         <p:cNvPr id="1" name="Shape 159">
           <a:extLst>
             <a:ext uri="{FF2B5EF4-FFF2-40B4-BE49-F238E27FC236}">
-              <a16:creationId xmlns:a16="http://schemas.microsoft.com/office/drawing/2014/main" id="{29716E8D-0592-A2A5-E96A-C773DF3C27F9}"/>
-            </a:ext>
-          </a:extLst>
-        </p:cNvPr>
-        <p:cNvGrpSpPr/>
-        <p:nvPr/>
-      </p:nvGrpSpPr>
-      <p:grpSpPr>
-        <a:xfrm>
-          <a:off x="0" y="0"/>
-          <a:ext cx="0" cy="0"/>
-          <a:chOff x="0" y="0"/>
-          <a:chExt cx="0" cy="0"/>
-        </a:xfrm>
-      </p:grpSpPr>
-      <p:sp>
-        <p:nvSpPr>
-          <p:cNvPr id="160" name="Google Shape;160;g2f426c55b76_0_11:notes">
-            <a:extLst>
-              <a:ext uri="{FF2B5EF4-FFF2-40B4-BE49-F238E27FC236}">
-                <a16:creationId xmlns:a16="http://schemas.microsoft.com/office/drawing/2014/main" id="{9322AB5F-E11E-1172-76FD-FCC83AA38138}"/>
-              </a:ext>
-            </a:extLst>
-          </p:cNvPr>
-          <p:cNvSpPr>
-            <a:spLocks noGrp="1" noRot="1" noChangeAspect="1"/>
-          </p:cNvSpPr>
-          <p:nvPr>
-            <p:ph type="sldImg" idx="2"/>
-          </p:nvPr>
-        </p:nvSpPr>
-        <p:spPr>
-          <a:xfrm>
-            <a:off x="381000" y="685800"/>
-            <a:ext cx="6096000" cy="3429000"/>
-          </a:xfrm>
-          <a:custGeom>
-            <a:avLst/>
-            <a:gdLst/>
-            <a:ahLst/>
-            <a:cxnLst/>
-            <a:rect l="l" t="t" r="r" b="b"/>
-            <a:pathLst>
-              <a:path w="120000" h="120000" extrusionOk="0">
-                <a:moveTo>
-                  <a:pt x="0" y="0"/>
-                </a:moveTo>
-                <a:lnTo>
-                  <a:pt x="120000" y="0"/>
-                </a:lnTo>
-                <a:lnTo>
-                  <a:pt x="120000" y="120000"/>
-                </a:lnTo>
-                <a:lnTo>
-                  <a:pt x="0" y="120000"/>
-                </a:lnTo>
-                <a:close/>
-              </a:path>
-            </a:pathLst>
-          </a:custGeom>
-        </p:spPr>
-      </p:sp>
-      <p:sp>
-        <p:nvSpPr>
-          <p:cNvPr id="161" name="Google Shape;161;g2f426c55b76_0_11:notes">
-            <a:extLst>
-              <a:ext uri="{FF2B5EF4-FFF2-40B4-BE49-F238E27FC236}">
-                <a16:creationId xmlns:a16="http://schemas.microsoft.com/office/drawing/2014/main" id="{F109EAD8-3954-B8EB-C3BC-668FCCDA146D}"/>
-              </a:ext>
-            </a:extLst>
-          </p:cNvPr>
-          <p:cNvSpPr txBox="1">
-            <a:spLocks noGrp="1"/>
-          </p:cNvSpPr>
-          <p:nvPr>
-            <p:ph type="body" idx="1"/>
-          </p:nvPr>
-        </p:nvSpPr>
-        <p:spPr>
-          <a:xfrm>
-            <a:off x="685800" y="4343400"/>
-            <a:ext cx="5486400" cy="4114800"/>
-          </a:xfrm>
-          <a:prstGeom prst="rect">
-            <a:avLst/>
-          </a:prstGeom>
-        </p:spPr>
-        <p:txBody>
-          <a:bodyPr spcFirstLastPara="1" wrap="square" lIns="91425" tIns="91425" rIns="91425" bIns="91425" anchor="t" anchorCtr="0">
-            <a:noAutofit/>
-          </a:bodyPr>
-          <a:lstStyle/>
-          <a:p>
-            <a:pPr marL="285750" lvl="0" indent="-285750" algn="l" rtl="0">
-              <a:spcBef>
-                <a:spcPts val="600"/>
-              </a:spcBef>
-              <a:spcAft>
-                <a:spcPts val="0"/>
-              </a:spcAft>
-              <a:buFont typeface="Arial" panose="020B0604020202020204" pitchFamily="34" charset="0"/>
-              <a:buChar char="•"/>
-            </a:pPr>
-            <a:endParaRPr sz="1200" dirty="0">
-              <a:solidFill>
-                <a:schemeClr val="dk1"/>
-              </a:solidFill>
-              <a:latin typeface="Lato"/>
-              <a:ea typeface="Lato"/>
-              <a:cs typeface="Lato"/>
-              <a:sym typeface="Lato"/>
-            </a:endParaRPr>
-          </a:p>
-        </p:txBody>
-      </p:sp>
-    </p:spTree>
-    <p:extLst>
-      <p:ext uri="{BB962C8B-B14F-4D97-AF65-F5344CB8AC3E}">
-        <p14:creationId xmlns:p14="http://schemas.microsoft.com/office/powerpoint/2010/main" val="2103812158"/>
-      </p:ext>
-    </p:extLst>
-  </p:cSld>
-  <p:clrMapOvr>
-    <a:masterClrMapping/>
-  </p:clrMapOvr>
-</p:notes>
-</file>
-
-<file path=ppt/notesSlides/notesSlide6.xml><?xml version="1.0" encoding="utf-8"?>
-<p:notes xmlns:a="http://schemas.openxmlformats.org/drawingml/2006/main" xmlns:r="http://schemas.openxmlformats.org/officeDocument/2006/relationships" xmlns:p="http://schemas.openxmlformats.org/presentationml/2006/main" showMasterSp="0" showMasterPhAnim="0">
-  <p:cSld>
-    <p:spTree>
-      <p:nvGrpSpPr>
-        <p:cNvPr id="1" name="Shape 159">
-          <a:extLst>
-            <a:ext uri="{FF2B5EF4-FFF2-40B4-BE49-F238E27FC236}">
               <a16:creationId xmlns:a16="http://schemas.microsoft.com/office/drawing/2014/main" id="{E14FFB61-C4FE-2E6A-14F7-0DAB37BFE9B8}"/>
             </a:ext>
           </a:extLst>
@@ -3672,7 +3391,7 @@
 </p:notes>
 </file>
 
-<file path=ppt/notesSlides/notesSlide7.xml><?xml version="1.0" encoding="utf-8"?>
+<file path=ppt/notesSlides/notesSlide6.xml><?xml version="1.0" encoding="utf-8"?>
 <p:notes xmlns:a="http://schemas.openxmlformats.org/drawingml/2006/main" xmlns:r="http://schemas.openxmlformats.org/officeDocument/2006/relationships" xmlns:p="http://schemas.openxmlformats.org/presentationml/2006/main" showMasterSp="0" showMasterPhAnim="0">
   <p:cSld>
     <p:spTree>
@@ -3808,7 +3527,7 @@
 </p:notes>
 </file>
 
-<file path=ppt/notesSlides/notesSlide8.xml><?xml version="1.0" encoding="utf-8"?>
+<file path=ppt/notesSlides/notesSlide7.xml><?xml version="1.0" encoding="utf-8"?>
 <p:notes xmlns:a="http://schemas.openxmlformats.org/drawingml/2006/main" xmlns:r="http://schemas.openxmlformats.org/officeDocument/2006/relationships" xmlns:p="http://schemas.openxmlformats.org/presentationml/2006/main" showMasterSp="0" showMasterPhAnim="0">
   <p:cSld>
     <p:spTree>
@@ -3944,7 +3663,7 @@
 </p:notes>
 </file>
 
-<file path=ppt/notesSlides/notesSlide9.xml><?xml version="1.0" encoding="utf-8"?>
+<file path=ppt/notesSlides/notesSlide8.xml><?xml version="1.0" encoding="utf-8"?>
 <p:notes xmlns:a="http://schemas.openxmlformats.org/drawingml/2006/main" xmlns:r="http://schemas.openxmlformats.org/officeDocument/2006/relationships" xmlns:p="http://schemas.openxmlformats.org/presentationml/2006/main" showMasterSp="0" showMasterPhAnim="0">
   <p:cSld>
     <p:spTree>
@@ -4071,6 +3790,150 @@
     <p:extLst>
       <p:ext uri="{BB962C8B-B14F-4D97-AF65-F5344CB8AC3E}">
         <p14:creationId xmlns:p14="http://schemas.microsoft.com/office/powerpoint/2010/main" val="997974550"/>
+      </p:ext>
+    </p:extLst>
+  </p:cSld>
+  <p:clrMapOvr>
+    <a:masterClrMapping/>
+  </p:clrMapOvr>
+</p:notes>
+</file>
+
+<file path=ppt/notesSlides/notesSlide9.xml><?xml version="1.0" encoding="utf-8"?>
+<p:notes xmlns:a="http://schemas.openxmlformats.org/drawingml/2006/main" xmlns:r="http://schemas.openxmlformats.org/officeDocument/2006/relationships" xmlns:p="http://schemas.openxmlformats.org/presentationml/2006/main" showMasterSp="0" showMasterPhAnim="0">
+  <p:cSld>
+    <p:spTree>
+      <p:nvGrpSpPr>
+        <p:cNvPr id="1" name="Shape 159">
+          <a:extLst>
+            <a:ext uri="{FF2B5EF4-FFF2-40B4-BE49-F238E27FC236}">
+              <a16:creationId xmlns:a16="http://schemas.microsoft.com/office/drawing/2014/main" id="{2B133D30-E3FF-D278-5E3A-71CB6A1512F5}"/>
+            </a:ext>
+          </a:extLst>
+        </p:cNvPr>
+        <p:cNvGrpSpPr/>
+        <p:nvPr/>
+      </p:nvGrpSpPr>
+      <p:grpSpPr>
+        <a:xfrm>
+          <a:off x="0" y="0"/>
+          <a:ext cx="0" cy="0"/>
+          <a:chOff x="0" y="0"/>
+          <a:chExt cx="0" cy="0"/>
+        </a:xfrm>
+      </p:grpSpPr>
+      <p:sp>
+        <p:nvSpPr>
+          <p:cNvPr id="160" name="Google Shape;160;g2f426c55b76_0_11:notes">
+            <a:extLst>
+              <a:ext uri="{FF2B5EF4-FFF2-40B4-BE49-F238E27FC236}">
+                <a16:creationId xmlns:a16="http://schemas.microsoft.com/office/drawing/2014/main" id="{66A03202-B060-4079-129F-9EEAA9A3120F}"/>
+              </a:ext>
+            </a:extLst>
+          </p:cNvPr>
+          <p:cNvSpPr>
+            <a:spLocks noGrp="1" noRot="1" noChangeAspect="1"/>
+          </p:cNvSpPr>
+          <p:nvPr>
+            <p:ph type="sldImg" idx="2"/>
+          </p:nvPr>
+        </p:nvSpPr>
+        <p:spPr>
+          <a:xfrm>
+            <a:off x="381000" y="685800"/>
+            <a:ext cx="6096000" cy="3429000"/>
+          </a:xfrm>
+          <a:custGeom>
+            <a:avLst/>
+            <a:gdLst/>
+            <a:ahLst/>
+            <a:cxnLst/>
+            <a:rect l="l" t="t" r="r" b="b"/>
+            <a:pathLst>
+              <a:path w="120000" h="120000" extrusionOk="0">
+                <a:moveTo>
+                  <a:pt x="0" y="0"/>
+                </a:moveTo>
+                <a:lnTo>
+                  <a:pt x="120000" y="0"/>
+                </a:lnTo>
+                <a:lnTo>
+                  <a:pt x="120000" y="120000"/>
+                </a:lnTo>
+                <a:lnTo>
+                  <a:pt x="0" y="120000"/>
+                </a:lnTo>
+                <a:close/>
+              </a:path>
+            </a:pathLst>
+          </a:custGeom>
+        </p:spPr>
+      </p:sp>
+      <p:sp>
+        <p:nvSpPr>
+          <p:cNvPr id="161" name="Google Shape;161;g2f426c55b76_0_11:notes">
+            <a:extLst>
+              <a:ext uri="{FF2B5EF4-FFF2-40B4-BE49-F238E27FC236}">
+                <a16:creationId xmlns:a16="http://schemas.microsoft.com/office/drawing/2014/main" id="{08D81A5D-7615-48E5-9B96-052FF241443F}"/>
+              </a:ext>
+            </a:extLst>
+          </p:cNvPr>
+          <p:cNvSpPr txBox="1">
+            <a:spLocks noGrp="1"/>
+          </p:cNvSpPr>
+          <p:nvPr>
+            <p:ph type="body" idx="1"/>
+          </p:nvPr>
+        </p:nvSpPr>
+        <p:spPr>
+          <a:xfrm>
+            <a:off x="685800" y="4343400"/>
+            <a:ext cx="5486400" cy="4114800"/>
+          </a:xfrm>
+          <a:prstGeom prst="rect">
+            <a:avLst/>
+          </a:prstGeom>
+        </p:spPr>
+        <p:txBody>
+          <a:bodyPr spcFirstLastPara="1" wrap="square" lIns="91425" tIns="91425" rIns="91425" bIns="91425" anchor="t" anchorCtr="0">
+            <a:noAutofit/>
+          </a:bodyPr>
+          <a:lstStyle/>
+          <a:p>
+            <a:pPr marL="285750" lvl="0" indent="-285750" algn="l" rtl="0">
+              <a:spcBef>
+                <a:spcPts val="600"/>
+              </a:spcBef>
+              <a:spcAft>
+                <a:spcPts val="0"/>
+              </a:spcAft>
+              <a:buFont typeface="Arial" panose="020B0604020202020204" pitchFamily="34" charset="0"/>
+              <a:buChar char="•"/>
+            </a:pPr>
+            <a:r>
+              <a:rPr lang="en-US" b="1" dirty="0"/>
+              <a:t>Takeaway:</a:t>
+            </a:r>
+            <a:r>
+              <a:rPr lang="en-US" dirty="0"/>
+              <a:t> intermediate strides (S=4 or S=8) balance speed and accuracy.</a:t>
+            </a:r>
+            <a:endParaRPr sz="1200" dirty="0">
+              <a:solidFill>
+                <a:schemeClr val="dk1"/>
+              </a:solidFill>
+              <a:latin typeface="Lato"/>
+              <a:ea typeface="Lato"/>
+              <a:cs typeface="Lato"/>
+              <a:sym typeface="Lato"/>
+            </a:endParaRPr>
+          </a:p>
+        </p:txBody>
+      </p:sp>
+    </p:spTree>
+    <p:extLst>
+      <p:ext uri="{BB962C8B-B14F-4D97-AF65-F5344CB8AC3E}">
+        <p14:creationId xmlns:p14="http://schemas.microsoft.com/office/powerpoint/2010/main" val="3472115502"/>
       </p:ext>
     </p:extLst>
   </p:cSld>
@@ -13659,973 +13522,6 @@
         <p:cNvPr id="1" name="Shape 162">
           <a:extLst>
             <a:ext uri="{FF2B5EF4-FFF2-40B4-BE49-F238E27FC236}">
-              <a16:creationId xmlns:a16="http://schemas.microsoft.com/office/drawing/2014/main" id="{4FA340A7-6C37-F1ED-B3AC-F8963A79175F}"/>
-            </a:ext>
-          </a:extLst>
-        </p:cNvPr>
-        <p:cNvGrpSpPr/>
-        <p:nvPr/>
-      </p:nvGrpSpPr>
-      <p:grpSpPr>
-        <a:xfrm>
-          <a:off x="0" y="0"/>
-          <a:ext cx="0" cy="0"/>
-          <a:chOff x="0" y="0"/>
-          <a:chExt cx="0" cy="0"/>
-        </a:xfrm>
-      </p:grpSpPr>
-      <p:sp>
-        <p:nvSpPr>
-          <p:cNvPr id="4" name="Google Shape;157;p27">
-            <a:extLst>
-              <a:ext uri="{FF2B5EF4-FFF2-40B4-BE49-F238E27FC236}">
-                <a16:creationId xmlns:a16="http://schemas.microsoft.com/office/drawing/2014/main" id="{AD92CB79-9F3C-6BEA-5457-3953A5D099AF}"/>
-              </a:ext>
-            </a:extLst>
-          </p:cNvPr>
-          <p:cNvSpPr txBox="1">
-            <a:spLocks/>
-          </p:cNvSpPr>
-          <p:nvPr/>
-        </p:nvSpPr>
-        <p:spPr>
-          <a:xfrm>
-            <a:off x="0" y="0"/>
-            <a:ext cx="12192000" cy="1051600"/>
-          </a:xfrm>
-          <a:prstGeom prst="rect">
-            <a:avLst/>
-          </a:prstGeom>
-          <a:noFill/>
-          <a:ln>
-            <a:noFill/>
-          </a:ln>
-        </p:spPr>
-        <p:txBody>
-          <a:bodyPr spcFirstLastPara="1" wrap="square" lIns="121900" tIns="121900" rIns="121900" bIns="121900" anchor="t" anchorCtr="0">
-            <a:noAutofit/>
-          </a:bodyPr>
-          <a:lstStyle>
-            <a:defPPr marR="0" lvl="0" algn="l" rtl="0">
-              <a:lnSpc>
-                <a:spcPct val="100000"/>
-              </a:lnSpc>
-              <a:spcBef>
-                <a:spcPts val="0"/>
-              </a:spcBef>
-              <a:spcAft>
-                <a:spcPts val="0"/>
-              </a:spcAft>
-            </a:defPPr>
-            <a:lvl1pPr marL="457200" marR="0" lvl="0" indent="-381000" algn="l" rtl="0">
-              <a:lnSpc>
-                <a:spcPct val="100000"/>
-              </a:lnSpc>
-              <a:spcBef>
-                <a:spcPts val="600"/>
-              </a:spcBef>
-              <a:spcAft>
-                <a:spcPts val="0"/>
-              </a:spcAft>
-              <a:buClr>
-                <a:schemeClr val="accent6"/>
-              </a:buClr>
-              <a:buSzPts val="2400"/>
-              <a:buFont typeface="Lato"/>
-              <a:buChar char="▷"/>
-              <a:defRPr sz="2400" b="0" i="0" u="none" strike="noStrike" cap="none">
-                <a:solidFill>
-                  <a:schemeClr val="dk1"/>
-                </a:solidFill>
-                <a:latin typeface="Lato"/>
-                <a:ea typeface="Lato"/>
-                <a:cs typeface="Lato"/>
-                <a:sym typeface="Lato"/>
-              </a:defRPr>
-            </a:lvl1pPr>
-            <a:lvl2pPr marL="914400" marR="0" lvl="1" indent="-381000" algn="l" rtl="0">
-              <a:lnSpc>
-                <a:spcPct val="100000"/>
-              </a:lnSpc>
-              <a:spcBef>
-                <a:spcPts val="0"/>
-              </a:spcBef>
-              <a:spcAft>
-                <a:spcPts val="0"/>
-              </a:spcAft>
-              <a:buClr>
-                <a:schemeClr val="dk1"/>
-              </a:buClr>
-              <a:buSzPts val="2400"/>
-              <a:buFont typeface="Lato"/>
-              <a:buChar char="○"/>
-              <a:defRPr sz="2400" b="0" i="0" u="none" strike="noStrike" cap="none">
-                <a:solidFill>
-                  <a:schemeClr val="dk1"/>
-                </a:solidFill>
-                <a:latin typeface="Lato"/>
-                <a:ea typeface="Lato"/>
-                <a:cs typeface="Lato"/>
-                <a:sym typeface="Lato"/>
-              </a:defRPr>
-            </a:lvl2pPr>
-            <a:lvl3pPr marL="1371600" marR="0" lvl="2" indent="-381000" algn="l" rtl="0">
-              <a:lnSpc>
-                <a:spcPct val="100000"/>
-              </a:lnSpc>
-              <a:spcBef>
-                <a:spcPts val="0"/>
-              </a:spcBef>
-              <a:spcAft>
-                <a:spcPts val="0"/>
-              </a:spcAft>
-              <a:buClr>
-                <a:schemeClr val="dk1"/>
-              </a:buClr>
-              <a:buSzPts val="2400"/>
-              <a:buFont typeface="Lato"/>
-              <a:buChar char="■"/>
-              <a:defRPr sz="2400" b="0" i="0" u="none" strike="noStrike" cap="none">
-                <a:solidFill>
-                  <a:schemeClr val="dk1"/>
-                </a:solidFill>
-                <a:latin typeface="Lato"/>
-                <a:ea typeface="Lato"/>
-                <a:cs typeface="Lato"/>
-                <a:sym typeface="Lato"/>
-              </a:defRPr>
-            </a:lvl3pPr>
-            <a:lvl4pPr marL="1828800" marR="0" lvl="3" indent="-381000" algn="l" rtl="0">
-              <a:lnSpc>
-                <a:spcPct val="100000"/>
-              </a:lnSpc>
-              <a:spcBef>
-                <a:spcPts val="0"/>
-              </a:spcBef>
-              <a:spcAft>
-                <a:spcPts val="0"/>
-              </a:spcAft>
-              <a:buClr>
-                <a:schemeClr val="dk1"/>
-              </a:buClr>
-              <a:buSzPts val="2400"/>
-              <a:buFont typeface="Lato"/>
-              <a:buChar char="●"/>
-              <a:defRPr sz="2400" b="0" i="0" u="none" strike="noStrike" cap="none">
-                <a:solidFill>
-                  <a:schemeClr val="dk1"/>
-                </a:solidFill>
-                <a:latin typeface="Lato"/>
-                <a:ea typeface="Lato"/>
-                <a:cs typeface="Lato"/>
-                <a:sym typeface="Lato"/>
-              </a:defRPr>
-            </a:lvl4pPr>
-            <a:lvl5pPr marL="2286000" marR="0" lvl="4" indent="-381000" algn="l" rtl="0">
-              <a:lnSpc>
-                <a:spcPct val="100000"/>
-              </a:lnSpc>
-              <a:spcBef>
-                <a:spcPts val="0"/>
-              </a:spcBef>
-              <a:spcAft>
-                <a:spcPts val="0"/>
-              </a:spcAft>
-              <a:buClr>
-                <a:schemeClr val="dk1"/>
-              </a:buClr>
-              <a:buSzPts val="2400"/>
-              <a:buFont typeface="Lato"/>
-              <a:buChar char="○"/>
-              <a:defRPr sz="2400" b="0" i="0" u="none" strike="noStrike" cap="none">
-                <a:solidFill>
-                  <a:schemeClr val="dk1"/>
-                </a:solidFill>
-                <a:latin typeface="Lato"/>
-                <a:ea typeface="Lato"/>
-                <a:cs typeface="Lato"/>
-                <a:sym typeface="Lato"/>
-              </a:defRPr>
-            </a:lvl5pPr>
-            <a:lvl6pPr marL="2743200" marR="0" lvl="5" indent="-381000" algn="l" rtl="0">
-              <a:lnSpc>
-                <a:spcPct val="100000"/>
-              </a:lnSpc>
-              <a:spcBef>
-                <a:spcPts val="0"/>
-              </a:spcBef>
-              <a:spcAft>
-                <a:spcPts val="0"/>
-              </a:spcAft>
-              <a:buClr>
-                <a:schemeClr val="dk1"/>
-              </a:buClr>
-              <a:buSzPts val="2400"/>
-              <a:buFont typeface="Lato"/>
-              <a:buChar char="■"/>
-              <a:defRPr sz="2400" b="0" i="0" u="none" strike="noStrike" cap="none">
-                <a:solidFill>
-                  <a:schemeClr val="dk1"/>
-                </a:solidFill>
-                <a:latin typeface="Lato"/>
-                <a:ea typeface="Lato"/>
-                <a:cs typeface="Lato"/>
-                <a:sym typeface="Lato"/>
-              </a:defRPr>
-            </a:lvl6pPr>
-            <a:lvl7pPr marL="3200400" marR="0" lvl="6" indent="-381000" algn="l" rtl="0">
-              <a:lnSpc>
-                <a:spcPct val="100000"/>
-              </a:lnSpc>
-              <a:spcBef>
-                <a:spcPts val="0"/>
-              </a:spcBef>
-              <a:spcAft>
-                <a:spcPts val="0"/>
-              </a:spcAft>
-              <a:buClr>
-                <a:schemeClr val="dk1"/>
-              </a:buClr>
-              <a:buSzPts val="2400"/>
-              <a:buFont typeface="Lato"/>
-              <a:buChar char="●"/>
-              <a:defRPr sz="2400" b="0" i="0" u="none" strike="noStrike" cap="none">
-                <a:solidFill>
-                  <a:schemeClr val="dk1"/>
-                </a:solidFill>
-                <a:latin typeface="Lato"/>
-                <a:ea typeface="Lato"/>
-                <a:cs typeface="Lato"/>
-                <a:sym typeface="Lato"/>
-              </a:defRPr>
-            </a:lvl7pPr>
-            <a:lvl8pPr marL="3657600" marR="0" lvl="7" indent="-381000" algn="l" rtl="0">
-              <a:lnSpc>
-                <a:spcPct val="100000"/>
-              </a:lnSpc>
-              <a:spcBef>
-                <a:spcPts val="0"/>
-              </a:spcBef>
-              <a:spcAft>
-                <a:spcPts val="0"/>
-              </a:spcAft>
-              <a:buClr>
-                <a:schemeClr val="dk1"/>
-              </a:buClr>
-              <a:buSzPts val="2400"/>
-              <a:buFont typeface="Lato"/>
-              <a:buChar char="○"/>
-              <a:defRPr sz="2400" b="0" i="0" u="none" strike="noStrike" cap="none">
-                <a:solidFill>
-                  <a:schemeClr val="dk1"/>
-                </a:solidFill>
-                <a:latin typeface="Lato"/>
-                <a:ea typeface="Lato"/>
-                <a:cs typeface="Lato"/>
-                <a:sym typeface="Lato"/>
-              </a:defRPr>
-            </a:lvl8pPr>
-            <a:lvl9pPr marL="4114800" marR="0" lvl="8" indent="-381000" algn="l" rtl="0">
-              <a:lnSpc>
-                <a:spcPct val="100000"/>
-              </a:lnSpc>
-              <a:spcBef>
-                <a:spcPts val="0"/>
-              </a:spcBef>
-              <a:spcAft>
-                <a:spcPts val="0"/>
-              </a:spcAft>
-              <a:buClr>
-                <a:schemeClr val="dk1"/>
-              </a:buClr>
-              <a:buSzPts val="2400"/>
-              <a:buFont typeface="Lato"/>
-              <a:buChar char="■"/>
-              <a:defRPr sz="2400" b="0" i="0" u="none" strike="noStrike" cap="none">
-                <a:solidFill>
-                  <a:schemeClr val="dk1"/>
-                </a:solidFill>
-                <a:latin typeface="Lato"/>
-                <a:ea typeface="Lato"/>
-                <a:cs typeface="Lato"/>
-                <a:sym typeface="Lato"/>
-              </a:defRPr>
-            </a:lvl9pPr>
-          </a:lstStyle>
-          <a:p>
-            <a:pPr marL="0" indent="0" defTabSz="1219170">
-              <a:spcBef>
-                <a:spcPts val="0"/>
-              </a:spcBef>
-              <a:buClr>
-                <a:srgbClr val="97ABBC"/>
-              </a:buClr>
-              <a:buNone/>
-            </a:pPr>
-            <a:r>
-              <a:rPr lang="en-US" sz="5333" b="1" kern="0" dirty="0">
-                <a:solidFill>
-                  <a:srgbClr val="2185C5"/>
-                </a:solidFill>
-                <a:latin typeface="Raleway"/>
-                <a:ea typeface="Raleway"/>
-                <a:cs typeface="Raleway"/>
-                <a:sym typeface="Raleway"/>
-              </a:rPr>
-              <a:t>Results: Figure 2</a:t>
-            </a:r>
-            <a:endParaRPr lang="en-US" sz="3733" i="1" kern="0" dirty="0">
-              <a:solidFill>
-                <a:srgbClr val="2185C5"/>
-              </a:solidFill>
-              <a:latin typeface="Raleway"/>
-              <a:ea typeface="Raleway"/>
-              <a:cs typeface="Raleway"/>
-              <a:sym typeface="Raleway"/>
-            </a:endParaRPr>
-          </a:p>
-        </p:txBody>
-      </p:sp>
-      <p:sp>
-        <p:nvSpPr>
-          <p:cNvPr id="6" name="TextBox 5">
-            <a:extLst>
-              <a:ext uri="{FF2B5EF4-FFF2-40B4-BE49-F238E27FC236}">
-                <a16:creationId xmlns:a16="http://schemas.microsoft.com/office/drawing/2014/main" id="{42D75E7F-957E-9085-ED42-9979E878E07C}"/>
-              </a:ext>
-            </a:extLst>
-          </p:cNvPr>
-          <p:cNvSpPr txBox="1"/>
-          <p:nvPr/>
-        </p:nvSpPr>
-        <p:spPr>
-          <a:xfrm>
-            <a:off x="1338696" y="5750098"/>
-            <a:ext cx="10955482" cy="646331"/>
-          </a:xfrm>
-          <a:prstGeom prst="rect">
-            <a:avLst/>
-          </a:prstGeom>
-          <a:noFill/>
-        </p:spPr>
-        <p:txBody>
-          <a:bodyPr wrap="square">
-            <a:spAutoFit/>
-          </a:bodyPr>
-          <a:lstStyle/>
-          <a:p>
-            <a:r>
-              <a:rPr lang="en-US" b="1" dirty="0">
-                <a:solidFill>
-                  <a:schemeClr val="tx2">
-                    <a:lumMod val="10000"/>
-                  </a:schemeClr>
-                </a:solidFill>
-                <a:latin typeface="Lato" panose="020F0502020204030203" pitchFamily="34" charset="0"/>
-                <a:ea typeface="Lato" panose="020F0502020204030203" pitchFamily="34" charset="0"/>
-                <a:cs typeface="Lato" panose="020F0502020204030203" pitchFamily="34" charset="0"/>
-              </a:rPr>
-              <a:t>Figure 2:</a:t>
-            </a:r>
-            <a:r>
-              <a:rPr lang="en-US" dirty="0">
-                <a:solidFill>
-                  <a:schemeClr val="tx2">
-                    <a:lumMod val="10000"/>
-                  </a:schemeClr>
-                </a:solidFill>
-                <a:latin typeface="Lato" panose="020F0502020204030203" pitchFamily="34" charset="0"/>
-                <a:ea typeface="Lato" panose="020F0502020204030203" pitchFamily="34" charset="0"/>
-                <a:cs typeface="Lato" panose="020F0502020204030203" pitchFamily="34" charset="0"/>
-              </a:rPr>
-              <a:t> Tradeoff curve — error rises with stride; speedup increases (S=16 ~6000×); ROM shown as reference (~2% error, ~4500× speedup).</a:t>
-            </a:r>
-          </a:p>
-        </p:txBody>
-      </p:sp>
-      <p:pic>
-        <p:nvPicPr>
-          <p:cNvPr id="5" name="Picture 4">
-            <a:extLst>
-              <a:ext uri="{FF2B5EF4-FFF2-40B4-BE49-F238E27FC236}">
-                <a16:creationId xmlns:a16="http://schemas.microsoft.com/office/drawing/2014/main" id="{444365F8-FFF2-CF9E-DEB2-0A67F080E235}"/>
-              </a:ext>
-            </a:extLst>
-          </p:cNvPr>
-          <p:cNvPicPr>
-            <a:picLocks noChangeAspect="1"/>
-          </p:cNvPicPr>
-          <p:nvPr/>
-        </p:nvPicPr>
-        <p:blipFill rotWithShape="1">
-          <a:blip r:embed="rId3"/>
-          <a:srcRect l="7490" r="3634"/>
-          <a:stretch>
-            <a:fillRect/>
-          </a:stretch>
-        </p:blipFill>
-        <p:spPr bwMode="auto">
-          <a:xfrm>
-            <a:off x="1172440" y="1093165"/>
-            <a:ext cx="9190759" cy="4825757"/>
-          </a:xfrm>
-          <a:prstGeom prst="rect">
-            <a:avLst/>
-          </a:prstGeom>
-          <a:ln>
-            <a:noFill/>
-          </a:ln>
-          <a:extLst>
-            <a:ext uri="{53640926-AAD7-44D8-BBD7-CCE9431645EC}">
-              <a14:shadowObscured xmlns:a14="http://schemas.microsoft.com/office/drawing/2010/main"/>
-            </a:ext>
-          </a:extLst>
-        </p:spPr>
-      </p:pic>
-      <mc:AlternateContent xmlns:mc="http://schemas.openxmlformats.org/markup-compatibility/2006">
-        <mc:Choice xmlns:a14="http://schemas.microsoft.com/office/drawing/2010/main" Requires="a14">
-          <p:sp>
-            <p:nvSpPr>
-              <p:cNvPr id="7" name="TextBox 6">
-                <a:extLst>
-                  <a:ext uri="{FF2B5EF4-FFF2-40B4-BE49-F238E27FC236}">
-                    <a16:creationId xmlns:a16="http://schemas.microsoft.com/office/drawing/2014/main" id="{A5D8D122-45F1-CFDF-77CC-BCE2EB37E480}"/>
-                  </a:ext>
-                </a:extLst>
-              </p:cNvPr>
-              <p:cNvSpPr txBox="1"/>
-              <p:nvPr/>
-            </p:nvSpPr>
-            <p:spPr>
-              <a:xfrm>
-                <a:off x="9663546" y="180725"/>
-                <a:ext cx="2357889" cy="561692"/>
-              </a:xfrm>
-              <a:prstGeom prst="rect">
-                <a:avLst/>
-              </a:prstGeom>
-              <a:noFill/>
-            </p:spPr>
-            <p:txBody>
-              <a:bodyPr wrap="none" lIns="0" tIns="0" rIns="0" bIns="0" rtlCol="0">
-                <a:spAutoFit/>
-              </a:bodyPr>
-              <a:lstStyle/>
-              <a:p>
-                <a:pPr/>
-                <a14:m>
-                  <m:oMathPara xmlns:m="http://schemas.openxmlformats.org/officeDocument/2006/math">
-                    <m:oMathParaPr>
-                      <m:jc m:val="centerGroup"/>
-                    </m:oMathParaPr>
-                    <m:oMath xmlns:m="http://schemas.openxmlformats.org/officeDocument/2006/math">
-                      <m:sSub>
-                        <m:sSubPr>
-                          <m:ctrlPr>
-                            <a:rPr lang="en-US" sz="1400" i="1" smtClean="0">
-                              <a:solidFill>
-                                <a:schemeClr val="tx2">
-                                  <a:lumMod val="10000"/>
-                                </a:schemeClr>
-                              </a:solidFill>
-                              <a:latin typeface="Cambria Math" panose="02040503050406030204" pitchFamily="18" charset="0"/>
-                            </a:rPr>
-                          </m:ctrlPr>
-                        </m:sSubPr>
-                        <m:e>
-                          <m:r>
-                            <a:rPr lang="en-US" sz="1400" b="0" i="1" smtClean="0">
-                              <a:solidFill>
-                                <a:schemeClr val="tx2">
-                                  <a:lumMod val="10000"/>
-                                </a:schemeClr>
-                              </a:solidFill>
-                              <a:latin typeface="Cambria Math" panose="02040503050406030204" pitchFamily="18" charset="0"/>
-                            </a:rPr>
-                            <m:t>𝐸𝑟𝑟𝑜𝑟</m:t>
-                          </m:r>
-                        </m:e>
-                        <m:sub>
-                          <m:r>
-                            <a:rPr lang="en-US" sz="1400" b="0" i="1" smtClean="0">
-                              <a:solidFill>
-                                <a:schemeClr val="tx2">
-                                  <a:lumMod val="10000"/>
-                                </a:schemeClr>
-                              </a:solidFill>
-                              <a:latin typeface="Cambria Math" panose="02040503050406030204" pitchFamily="18" charset="0"/>
-                            </a:rPr>
-                            <m:t>𝑖</m:t>
-                          </m:r>
-                        </m:sub>
-                      </m:sSub>
-                      <m:r>
-                        <a:rPr lang="en-US" sz="1400" b="0" i="1" smtClean="0">
-                          <a:solidFill>
-                            <a:schemeClr val="tx2">
-                              <a:lumMod val="10000"/>
-                            </a:schemeClr>
-                          </a:solidFill>
-                          <a:latin typeface="Cambria Math" panose="02040503050406030204" pitchFamily="18" charset="0"/>
-                        </a:rPr>
-                        <m:t>=</m:t>
-                      </m:r>
-                      <m:f>
-                        <m:fPr>
-                          <m:ctrlPr>
-                            <a:rPr lang="en-US" sz="1400" i="1" smtClean="0">
-                              <a:solidFill>
-                                <a:schemeClr val="tx2">
-                                  <a:lumMod val="10000"/>
-                                </a:schemeClr>
-                              </a:solidFill>
-                              <a:latin typeface="Cambria Math" panose="02040503050406030204" pitchFamily="18" charset="0"/>
-                            </a:rPr>
-                          </m:ctrlPr>
-                        </m:fPr>
-                        <m:num>
-                          <m:d>
-                            <m:dPr>
-                              <m:begChr m:val="‖"/>
-                              <m:endChr m:val="‖"/>
-                              <m:ctrlPr>
-                                <a:rPr lang="en-US" sz="1400" i="1" smtClean="0">
-                                  <a:solidFill>
-                                    <a:schemeClr val="tx2">
-                                      <a:lumMod val="10000"/>
-                                    </a:schemeClr>
-                                  </a:solidFill>
-                                  <a:latin typeface="Cambria Math" panose="02040503050406030204" pitchFamily="18" charset="0"/>
-                                </a:rPr>
-                              </m:ctrlPr>
-                            </m:dPr>
-                            <m:e>
-                              <m:sSubSup>
-                                <m:sSubSupPr>
-                                  <m:ctrlPr>
-                                    <a:rPr lang="en-US" sz="1400" i="1" smtClean="0">
-                                      <a:solidFill>
-                                        <a:schemeClr val="tx2">
-                                          <a:lumMod val="10000"/>
-                                        </a:schemeClr>
-                                      </a:solidFill>
-                                      <a:latin typeface="Cambria Math" panose="02040503050406030204" pitchFamily="18" charset="0"/>
-                                    </a:rPr>
-                                  </m:ctrlPr>
-                                </m:sSubSupPr>
-                                <m:e>
-                                  <m:r>
-                                    <a:rPr lang="en-US" sz="1400" i="1" smtClean="0">
-                                      <a:solidFill>
-                                        <a:schemeClr val="tx2">
-                                          <a:lumMod val="10000"/>
-                                        </a:schemeClr>
-                                      </a:solidFill>
-                                      <a:latin typeface="Cambria Math" panose="02040503050406030204" pitchFamily="18" charset="0"/>
-                                      <a:ea typeface="Cambria Math" panose="02040503050406030204" pitchFamily="18" charset="0"/>
-                                    </a:rPr>
-                                    <m:t>𝜎</m:t>
-                                  </m:r>
-                                </m:e>
-                                <m:sub>
-                                  <m:r>
-                                    <a:rPr lang="en-US" sz="1400" b="0" i="1" smtClean="0">
-                                      <a:solidFill>
-                                        <a:schemeClr val="tx2">
-                                          <a:lumMod val="10000"/>
-                                        </a:schemeClr>
-                                      </a:solidFill>
-                                      <a:latin typeface="Cambria Math" panose="02040503050406030204" pitchFamily="18" charset="0"/>
-                                    </a:rPr>
-                                    <m:t>𝑣𝑚</m:t>
-                                  </m:r>
-                                </m:sub>
-                                <m:sup>
-                                  <m:r>
-                                    <a:rPr lang="en-US" sz="1400" b="0" i="1" smtClean="0">
-                                      <a:solidFill>
-                                        <a:schemeClr val="tx2">
-                                          <a:lumMod val="10000"/>
-                                        </a:schemeClr>
-                                      </a:solidFill>
-                                      <a:latin typeface="Cambria Math" panose="02040503050406030204" pitchFamily="18" charset="0"/>
-                                    </a:rPr>
-                                    <m:t>𝑓𝑢𝑙𝑙</m:t>
-                                  </m:r>
-                                </m:sup>
-                              </m:sSubSup>
-                              <m:r>
-                                <a:rPr lang="en-US" sz="1400" b="0" i="1" smtClean="0">
-                                  <a:solidFill>
-                                    <a:schemeClr val="tx2">
-                                      <a:lumMod val="10000"/>
-                                    </a:schemeClr>
-                                  </a:solidFill>
-                                  <a:latin typeface="Cambria Math" panose="02040503050406030204" pitchFamily="18" charset="0"/>
-                                </a:rPr>
-                                <m:t>(</m:t>
-                              </m:r>
-                              <m:r>
-                                <a:rPr lang="en-US" sz="1400" b="0" i="1" smtClean="0">
-                                  <a:solidFill>
-                                    <a:schemeClr val="tx2">
-                                      <a:lumMod val="10000"/>
-                                    </a:schemeClr>
-                                  </a:solidFill>
-                                  <a:latin typeface="Cambria Math" panose="02040503050406030204" pitchFamily="18" charset="0"/>
-                                </a:rPr>
-                                <m:t>𝑖</m:t>
-                              </m:r>
-                              <m:r>
-                                <a:rPr lang="en-US" sz="1400" b="0" i="1" smtClean="0">
-                                  <a:solidFill>
-                                    <a:schemeClr val="tx2">
-                                      <a:lumMod val="10000"/>
-                                    </a:schemeClr>
-                                  </a:solidFill>
-                                  <a:latin typeface="Cambria Math" panose="02040503050406030204" pitchFamily="18" charset="0"/>
-                                </a:rPr>
-                                <m:t>)−</m:t>
-                              </m:r>
-                              <m:sSubSup>
-                                <m:sSubSupPr>
-                                  <m:ctrlPr>
-                                    <a:rPr lang="en-US" sz="1400" i="1">
-                                      <a:solidFill>
-                                        <a:schemeClr val="tx2">
-                                          <a:lumMod val="10000"/>
-                                        </a:schemeClr>
-                                      </a:solidFill>
-                                      <a:latin typeface="Cambria Math" panose="02040503050406030204" pitchFamily="18" charset="0"/>
-                                    </a:rPr>
-                                  </m:ctrlPr>
-                                </m:sSubSupPr>
-                                <m:e>
-                                  <m:r>
-                                    <a:rPr lang="en-US" sz="1400" i="1">
-                                      <a:solidFill>
-                                        <a:schemeClr val="tx2">
-                                          <a:lumMod val="10000"/>
-                                        </a:schemeClr>
-                                      </a:solidFill>
-                                      <a:latin typeface="Cambria Math" panose="02040503050406030204" pitchFamily="18" charset="0"/>
-                                      <a:ea typeface="Cambria Math" panose="02040503050406030204" pitchFamily="18" charset="0"/>
-                                    </a:rPr>
-                                    <m:t>𝜎</m:t>
-                                  </m:r>
-                                </m:e>
-                                <m:sub>
-                                  <m:r>
-                                    <a:rPr lang="en-US" sz="1400" i="1">
-                                      <a:solidFill>
-                                        <a:schemeClr val="tx2">
-                                          <a:lumMod val="10000"/>
-                                        </a:schemeClr>
-                                      </a:solidFill>
-                                      <a:latin typeface="Cambria Math" panose="02040503050406030204" pitchFamily="18" charset="0"/>
-                                    </a:rPr>
-                                    <m:t>𝑣𝑚</m:t>
-                                  </m:r>
-                                </m:sub>
-                                <m:sup>
-                                  <m:r>
-                                    <a:rPr lang="en-US" sz="1400" b="0" i="1" smtClean="0">
-                                      <a:solidFill>
-                                        <a:schemeClr val="tx2">
-                                          <a:lumMod val="10000"/>
-                                        </a:schemeClr>
-                                      </a:solidFill>
-                                      <a:latin typeface="Cambria Math" panose="02040503050406030204" pitchFamily="18" charset="0"/>
-                                    </a:rPr>
-                                    <m:t>𝑠𝑢𝑏</m:t>
-                                  </m:r>
-                                </m:sup>
-                              </m:sSubSup>
-                              <m:r>
-                                <a:rPr lang="en-US" sz="1400" b="0" i="1" smtClean="0">
-                                  <a:solidFill>
-                                    <a:schemeClr val="tx2">
-                                      <a:lumMod val="10000"/>
-                                    </a:schemeClr>
-                                  </a:solidFill>
-                                  <a:latin typeface="Cambria Math" panose="02040503050406030204" pitchFamily="18" charset="0"/>
-                                </a:rPr>
-                                <m:t>(</m:t>
-                              </m:r>
-                              <m:r>
-                                <a:rPr lang="en-US" sz="1400" b="0" i="1" smtClean="0">
-                                  <a:solidFill>
-                                    <a:schemeClr val="tx2">
-                                      <a:lumMod val="10000"/>
-                                    </a:schemeClr>
-                                  </a:solidFill>
-                                  <a:latin typeface="Cambria Math" panose="02040503050406030204" pitchFamily="18" charset="0"/>
-                                </a:rPr>
-                                <m:t>𝑖</m:t>
-                              </m:r>
-                              <m:r>
-                                <a:rPr lang="en-US" sz="1400" b="0" i="1" smtClean="0">
-                                  <a:solidFill>
-                                    <a:schemeClr val="tx2">
-                                      <a:lumMod val="10000"/>
-                                    </a:schemeClr>
-                                  </a:solidFill>
-                                  <a:latin typeface="Cambria Math" panose="02040503050406030204" pitchFamily="18" charset="0"/>
-                                </a:rPr>
-                                <m:t>)</m:t>
-                              </m:r>
-                            </m:e>
-                          </m:d>
-                        </m:num>
-                        <m:den>
-                          <m:r>
-                            <m:rPr>
-                              <m:sty m:val="p"/>
-                            </m:rPr>
-                            <a:rPr lang="en-US" sz="1400" b="0" i="0" smtClean="0">
-                              <a:solidFill>
-                                <a:schemeClr val="tx2">
-                                  <a:lumMod val="10000"/>
-                                </a:schemeClr>
-                              </a:solidFill>
-                              <a:latin typeface="Cambria Math" panose="02040503050406030204" pitchFamily="18" charset="0"/>
-                            </a:rPr>
-                            <m:t>max</m:t>
-                          </m:r>
-                          <m:r>
-                            <a:rPr lang="en-US" sz="1400" b="0" i="1" smtClean="0">
-                              <a:solidFill>
-                                <a:schemeClr val="tx2">
-                                  <a:lumMod val="10000"/>
-                                </a:schemeClr>
-                              </a:solidFill>
-                              <a:latin typeface="Cambria Math" panose="02040503050406030204" pitchFamily="18" charset="0"/>
-                            </a:rPr>
-                            <m:t>⁡(</m:t>
-                          </m:r>
-                          <m:d>
-                            <m:dPr>
-                              <m:begChr m:val="‖"/>
-                              <m:endChr m:val="‖"/>
-                              <m:ctrlPr>
-                                <a:rPr lang="en-US" sz="1400" b="0" i="1" smtClean="0">
-                                  <a:solidFill>
-                                    <a:schemeClr val="tx2">
-                                      <a:lumMod val="10000"/>
-                                    </a:schemeClr>
-                                  </a:solidFill>
-                                  <a:latin typeface="Cambria Math" panose="02040503050406030204" pitchFamily="18" charset="0"/>
-                                </a:rPr>
-                              </m:ctrlPr>
-                            </m:dPr>
-                            <m:e>
-                              <m:sSubSup>
-                                <m:sSubSupPr>
-                                  <m:ctrlPr>
-                                    <a:rPr lang="en-US" sz="1400" i="1">
-                                      <a:solidFill>
-                                        <a:schemeClr val="tx2">
-                                          <a:lumMod val="10000"/>
-                                        </a:schemeClr>
-                                      </a:solidFill>
-                                      <a:latin typeface="Cambria Math" panose="02040503050406030204" pitchFamily="18" charset="0"/>
-                                    </a:rPr>
-                                  </m:ctrlPr>
-                                </m:sSubSupPr>
-                                <m:e>
-                                  <m:r>
-                                    <a:rPr lang="en-US" sz="1400" i="1">
-                                      <a:solidFill>
-                                        <a:schemeClr val="tx2">
-                                          <a:lumMod val="10000"/>
-                                        </a:schemeClr>
-                                      </a:solidFill>
-                                      <a:latin typeface="Cambria Math" panose="02040503050406030204" pitchFamily="18" charset="0"/>
-                                      <a:ea typeface="Cambria Math" panose="02040503050406030204" pitchFamily="18" charset="0"/>
-                                    </a:rPr>
-                                    <m:t>𝜎</m:t>
-                                  </m:r>
-                                </m:e>
-                                <m:sub>
-                                  <m:r>
-                                    <a:rPr lang="en-US" sz="1400" i="1">
-                                      <a:solidFill>
-                                        <a:schemeClr val="tx2">
-                                          <a:lumMod val="10000"/>
-                                        </a:schemeClr>
-                                      </a:solidFill>
-                                      <a:latin typeface="Cambria Math" panose="02040503050406030204" pitchFamily="18" charset="0"/>
-                                    </a:rPr>
-                                    <m:t>𝑣𝑚</m:t>
-                                  </m:r>
-                                </m:sub>
-                                <m:sup>
-                                  <m:r>
-                                    <a:rPr lang="en-US" sz="1400" i="1">
-                                      <a:solidFill>
-                                        <a:schemeClr val="tx2">
-                                          <a:lumMod val="10000"/>
-                                        </a:schemeClr>
-                                      </a:solidFill>
-                                      <a:latin typeface="Cambria Math" panose="02040503050406030204" pitchFamily="18" charset="0"/>
-                                    </a:rPr>
-                                    <m:t>𝑓𝑢𝑙𝑙</m:t>
-                                  </m:r>
-                                </m:sup>
-                              </m:sSubSup>
-                              <m:d>
-                                <m:dPr>
-                                  <m:ctrlPr>
-                                    <a:rPr lang="en-US" sz="1400" i="1">
-                                      <a:solidFill>
-                                        <a:schemeClr val="tx2">
-                                          <a:lumMod val="10000"/>
-                                        </a:schemeClr>
-                                      </a:solidFill>
-                                      <a:latin typeface="Cambria Math" panose="02040503050406030204" pitchFamily="18" charset="0"/>
-                                    </a:rPr>
-                                  </m:ctrlPr>
-                                </m:dPr>
-                                <m:e>
-                                  <m:r>
-                                    <a:rPr lang="en-US" sz="1400" i="1">
-                                      <a:solidFill>
-                                        <a:schemeClr val="tx2">
-                                          <a:lumMod val="10000"/>
-                                        </a:schemeClr>
-                                      </a:solidFill>
-                                      <a:latin typeface="Cambria Math" panose="02040503050406030204" pitchFamily="18" charset="0"/>
-                                    </a:rPr>
-                                    <m:t>𝑖</m:t>
-                                  </m:r>
-                                </m:e>
-                              </m:d>
-                            </m:e>
-                          </m:d>
-                          <m:r>
-                            <a:rPr lang="en-US" sz="1400" b="0" i="1" smtClean="0">
-                              <a:solidFill>
-                                <a:schemeClr val="tx2">
-                                  <a:lumMod val="10000"/>
-                                </a:schemeClr>
-                              </a:solidFill>
-                              <a:latin typeface="Cambria Math" panose="02040503050406030204" pitchFamily="18" charset="0"/>
-                            </a:rPr>
-                            <m:t>−</m:t>
-                          </m:r>
-                          <m:r>
-                            <a:rPr lang="en-US" sz="1400" b="0" i="1" smtClean="0">
-                              <a:solidFill>
-                                <a:schemeClr val="tx2">
-                                  <a:lumMod val="10000"/>
-                                </a:schemeClr>
-                              </a:solidFill>
-                              <a:latin typeface="Cambria Math" panose="02040503050406030204" pitchFamily="18" charset="0"/>
-                              <a:ea typeface="Cambria Math" panose="02040503050406030204" pitchFamily="18" charset="0"/>
-                            </a:rPr>
-                            <m:t>𝜀</m:t>
-                          </m:r>
-                          <m:r>
-                            <a:rPr lang="en-US" sz="1400" b="0" i="1" smtClean="0">
-                              <a:solidFill>
-                                <a:schemeClr val="tx2">
-                                  <a:lumMod val="10000"/>
-                                </a:schemeClr>
-                              </a:solidFill>
-                              <a:latin typeface="Cambria Math" panose="02040503050406030204" pitchFamily="18" charset="0"/>
-                            </a:rPr>
-                            <m:t>)</m:t>
-                          </m:r>
-                        </m:den>
-                      </m:f>
-                    </m:oMath>
-                  </m:oMathPara>
-                </a14:m>
-                <a:endParaRPr lang="en-US" sz="1400" dirty="0">
-                  <a:solidFill>
-                    <a:schemeClr val="tx2">
-                      <a:lumMod val="10000"/>
-                    </a:schemeClr>
-                  </a:solidFill>
-                </a:endParaRPr>
-              </a:p>
-            </p:txBody>
-          </p:sp>
-        </mc:Choice>
-        <mc:Fallback>
-          <p:sp>
-            <p:nvSpPr>
-              <p:cNvPr id="7" name="TextBox 6">
-                <a:extLst>
-                  <a:ext uri="{FF2B5EF4-FFF2-40B4-BE49-F238E27FC236}">
-                    <a16:creationId xmlns:a16="http://schemas.microsoft.com/office/drawing/2014/main" id="{A5D8D122-45F1-CFDF-77CC-BCE2EB37E480}"/>
-                  </a:ext>
-                </a:extLst>
-              </p:cNvPr>
-              <p:cNvSpPr txBox="1">
-                <a:spLocks noRot="1" noChangeAspect="1" noMove="1" noResize="1" noEditPoints="1" noAdjustHandles="1" noChangeArrowheads="1" noChangeShapeType="1" noTextEdit="1"/>
-              </p:cNvSpPr>
-              <p:nvPr/>
-            </p:nvSpPr>
-            <p:spPr>
-              <a:xfrm>
-                <a:off x="9663546" y="180725"/>
-                <a:ext cx="2357889" cy="561692"/>
-              </a:xfrm>
-              <a:prstGeom prst="rect">
-                <a:avLst/>
-              </a:prstGeom>
-              <a:blipFill>
-                <a:blip r:embed="rId4"/>
-                <a:stretch>
-                  <a:fillRect l="-1070" t="-2222" r="-1604" b="-11111"/>
-                </a:stretch>
-              </a:blipFill>
-            </p:spPr>
-            <p:txBody>
-              <a:bodyPr/>
-              <a:lstStyle/>
-              <a:p>
-                <a:r>
-                  <a:rPr lang="en-US">
-                    <a:noFill/>
-                  </a:rPr>
-                  <a:t> </a:t>
-                </a:r>
-              </a:p>
-            </p:txBody>
-          </p:sp>
-        </mc:Fallback>
-      </mc:AlternateContent>
-    </p:spTree>
-    <p:extLst>
-      <p:ext uri="{BB962C8B-B14F-4D97-AF65-F5344CB8AC3E}">
-        <p14:creationId xmlns:p14="http://schemas.microsoft.com/office/powerpoint/2010/main" val="2751966900"/>
-      </p:ext>
-    </p:extLst>
-  </p:cSld>
-  <p:clrMapOvr>
-    <a:masterClrMapping/>
-  </p:clrMapOvr>
-  <mc:AlternateContent xmlns:mc="http://schemas.openxmlformats.org/markup-compatibility/2006" xmlns:p14="http://schemas.microsoft.com/office/powerpoint/2010/main">
-    <mc:Choice Requires="p14">
-      <p:transition p14:dur="0" advClick="0"/>
-    </mc:Choice>
-    <mc:Fallback xmlns="">
-      <p:transition advClick="0"/>
-    </mc:Fallback>
-  </mc:AlternateContent>
-</p:sld>
-</file>
-
-<file path=ppt/slides/slide11.xml><?xml version="1.0" encoding="utf-8"?>
-<p:sld xmlns:a="http://schemas.openxmlformats.org/drawingml/2006/main" xmlns:r="http://schemas.openxmlformats.org/officeDocument/2006/relationships" xmlns:p="http://schemas.openxmlformats.org/presentationml/2006/main">
-  <p:cSld>
-    <p:spTree>
-      <p:nvGrpSpPr>
-        <p:cNvPr id="1" name="Shape 162">
-          <a:extLst>
-            <a:ext uri="{FF2B5EF4-FFF2-40B4-BE49-F238E27FC236}">
               <a16:creationId xmlns:a16="http://schemas.microsoft.com/office/drawing/2014/main" id="{4025C69F-B54B-9F25-315A-A4D1DC9AC3EB}"/>
             </a:ext>
           </a:extLst>
@@ -15114,7 +14010,7 @@
 </p:sld>
 </file>
 
-<file path=ppt/slides/slide12.xml><?xml version="1.0" encoding="utf-8"?>
+<file path=ppt/slides/slide11.xml><?xml version="1.0" encoding="utf-8"?>
 <p:sld xmlns:a="http://schemas.openxmlformats.org/drawingml/2006/main" xmlns:r="http://schemas.openxmlformats.org/officeDocument/2006/relationships" xmlns:p="http://schemas.openxmlformats.org/presentationml/2006/main">
   <p:cSld>
     <p:spTree>
@@ -15445,7 +14341,7 @@
 </p:sld>
 </file>
 
-<file path=ppt/slides/slide13.xml><?xml version="1.0" encoding="utf-8"?>
+<file path=ppt/slides/slide12.xml><?xml version="1.0" encoding="utf-8"?>
 <p:sld xmlns:a="http://schemas.openxmlformats.org/drawingml/2006/main" xmlns:r="http://schemas.openxmlformats.org/officeDocument/2006/relationships" xmlns:p="http://schemas.openxmlformats.org/presentationml/2006/main">
   <p:cSld>
     <p:spTree>
@@ -15503,7 +14399,7 @@
 </p:sld>
 </file>
 
-<file path=ppt/slides/slide14.xml><?xml version="1.0" encoding="utf-8"?>
+<file path=ppt/slides/slide13.xml><?xml version="1.0" encoding="utf-8"?>
 <p:sld xmlns:a="http://schemas.openxmlformats.org/drawingml/2006/main" xmlns:r="http://schemas.openxmlformats.org/officeDocument/2006/relationships" xmlns:p="http://schemas.openxmlformats.org/presentationml/2006/main">
   <p:cSld>
     <p:spTree>
@@ -16186,7 +15082,7 @@
 </p:sld>
 </file>
 
-<file path=ppt/slides/slide15.xml><?xml version="1.0" encoding="utf-8"?>
+<file path=ppt/slides/slide14.xml><?xml version="1.0" encoding="utf-8"?>
 <p:sld xmlns:a="http://schemas.openxmlformats.org/drawingml/2006/main" xmlns:r="http://schemas.openxmlformats.org/officeDocument/2006/relationships" xmlns:p="http://schemas.openxmlformats.org/presentationml/2006/main">
   <p:cSld>
     <p:spTree>
@@ -17088,7 +15984,7 @@
 </p:sld>
 </file>
 
-<file path=ppt/slides/slide16.xml><?xml version="1.0" encoding="utf-8"?>
+<file path=ppt/slides/slide15.xml><?xml version="1.0" encoding="utf-8"?>
 <p:sld xmlns:a="http://schemas.openxmlformats.org/drawingml/2006/main" xmlns:r="http://schemas.openxmlformats.org/officeDocument/2006/relationships" xmlns:p="http://schemas.openxmlformats.org/presentationml/2006/main">
   <p:cSld>
     <p:spTree>
@@ -17829,7 +16725,7 @@
 </p:sld>
 </file>
 
-<file path=ppt/slides/slide17.xml><?xml version="1.0" encoding="utf-8"?>
+<file path=ppt/slides/slide16.xml><?xml version="1.0" encoding="utf-8"?>
 <p:sld xmlns:a="http://schemas.openxmlformats.org/drawingml/2006/main" xmlns:r="http://schemas.openxmlformats.org/officeDocument/2006/relationships" xmlns:p="http://schemas.openxmlformats.org/presentationml/2006/main">
   <p:cSld>
     <p:spTree>
@@ -18570,7 +17466,7 @@
 </p:sld>
 </file>
 
-<file path=ppt/slides/slide18.xml><?xml version="1.0" encoding="utf-8"?>
+<file path=ppt/slides/slide17.xml><?xml version="1.0" encoding="utf-8"?>
 <p:sld xmlns:a="http://schemas.openxmlformats.org/drawingml/2006/main" xmlns:r="http://schemas.openxmlformats.org/officeDocument/2006/relationships" xmlns:p="http://schemas.openxmlformats.org/presentationml/2006/main">
   <p:cSld>
     <p:spTree>
@@ -19181,7 +18077,7 @@
 </p:sld>
 </file>
 
-<file path=ppt/slides/slide19.xml><?xml version="1.0" encoding="utf-8"?>
+<file path=ppt/slides/slide18.xml><?xml version="1.0" encoding="utf-8"?>
 <p:sld xmlns:a="http://schemas.openxmlformats.org/drawingml/2006/main" xmlns:r="http://schemas.openxmlformats.org/officeDocument/2006/relationships" xmlns:p="http://schemas.openxmlformats.org/presentationml/2006/main">
   <p:cSld>
     <p:spTree>
@@ -19792,6 +18688,288 @@
 </p:sld>
 </file>
 
+<file path=ppt/slides/slide19.xml><?xml version="1.0" encoding="utf-8"?>
+<p:sld xmlns:a="http://schemas.openxmlformats.org/drawingml/2006/main" xmlns:r="http://schemas.openxmlformats.org/officeDocument/2006/relationships" xmlns:p="http://schemas.openxmlformats.org/presentationml/2006/main">
+  <p:cSld>
+    <p:spTree>
+      <p:nvGrpSpPr>
+        <p:cNvPr id="1" name="Shape 156">
+          <a:extLst>
+            <a:ext uri="{FF2B5EF4-FFF2-40B4-BE49-F238E27FC236}">
+              <a16:creationId xmlns:a16="http://schemas.microsoft.com/office/drawing/2014/main" id="{062EFC7F-EC13-C06C-2562-F070E0E00563}"/>
+            </a:ext>
+          </a:extLst>
+        </p:cNvPr>
+        <p:cNvGrpSpPr/>
+        <p:nvPr/>
+      </p:nvGrpSpPr>
+      <p:grpSpPr>
+        <a:xfrm>
+          <a:off x="0" y="0"/>
+          <a:ext cx="0" cy="0"/>
+          <a:chOff x="0" y="0"/>
+          <a:chExt cx="0" cy="0"/>
+        </a:xfrm>
+      </p:grpSpPr>
+      <p:sp>
+        <p:nvSpPr>
+          <p:cNvPr id="157" name="Google Shape;157;p27">
+            <a:extLst>
+              <a:ext uri="{FF2B5EF4-FFF2-40B4-BE49-F238E27FC236}">
+                <a16:creationId xmlns:a16="http://schemas.microsoft.com/office/drawing/2014/main" id="{D00055DB-6A18-C1F0-C8E8-DF5D3A961D9C}"/>
+              </a:ext>
+            </a:extLst>
+          </p:cNvPr>
+          <p:cNvSpPr txBox="1">
+            <a:spLocks noGrp="1"/>
+          </p:cNvSpPr>
+          <p:nvPr>
+            <p:ph type="subTitle" idx="4294967295"/>
+          </p:nvPr>
+        </p:nvSpPr>
+        <p:spPr>
+          <a:xfrm>
+            <a:off x="0" y="0"/>
+            <a:ext cx="12192000" cy="1051600"/>
+          </a:xfrm>
+          <a:prstGeom prst="rect">
+            <a:avLst/>
+          </a:prstGeom>
+        </p:spPr>
+        <p:txBody>
+          <a:bodyPr spcFirstLastPara="1" wrap="square" lIns="121900" tIns="121900" rIns="121900" bIns="121900" anchor="t" anchorCtr="0">
+            <a:noAutofit/>
+          </a:bodyPr>
+          <a:lstStyle/>
+          <a:p>
+            <a:pPr marL="0" indent="0">
+              <a:spcBef>
+                <a:spcPts val="0"/>
+              </a:spcBef>
+              <a:buNone/>
+            </a:pPr>
+            <a:r>
+              <a:rPr lang="en-US" sz="5333" b="1" dirty="0">
+                <a:solidFill>
+                  <a:schemeClr val="lt1"/>
+                </a:solidFill>
+                <a:latin typeface="Raleway"/>
+                <a:ea typeface="Raleway"/>
+                <a:cs typeface="Raleway"/>
+                <a:sym typeface="Raleway"/>
+              </a:rPr>
+              <a:t>(</a:t>
+            </a:r>
+            <a:r>
+              <a:rPr lang="en-US" sz="5333" b="1" dirty="0" err="1">
+                <a:solidFill>
+                  <a:schemeClr val="lt1"/>
+                </a:solidFill>
+                <a:latin typeface="Raleway"/>
+                <a:ea typeface="Raleway"/>
+                <a:cs typeface="Raleway"/>
+                <a:sym typeface="Raleway"/>
+              </a:rPr>
+              <a:t>get_damper</a:t>
+            </a:r>
+            <a:r>
+              <a:rPr lang="en-US" sz="5333" b="1" dirty="0">
+                <a:solidFill>
+                  <a:schemeClr val="lt1"/>
+                </a:solidFill>
+                <a:latin typeface="Raleway"/>
+                <a:ea typeface="Raleway"/>
+                <a:cs typeface="Raleway"/>
+                <a:sym typeface="Raleway"/>
+              </a:rPr>
+              <a:t>) (2): results</a:t>
+            </a:r>
+            <a:endParaRPr lang="en-US" sz="3733" i="1" dirty="0">
+              <a:solidFill>
+                <a:schemeClr val="lt1"/>
+              </a:solidFill>
+              <a:latin typeface="Raleway"/>
+              <a:ea typeface="Raleway"/>
+              <a:cs typeface="Raleway"/>
+              <a:sym typeface="Raleway"/>
+            </a:endParaRPr>
+          </a:p>
+        </p:txBody>
+      </p:sp>
+      <p:sp>
+        <p:nvSpPr>
+          <p:cNvPr id="158" name="Google Shape;158;p27">
+            <a:extLst>
+              <a:ext uri="{FF2B5EF4-FFF2-40B4-BE49-F238E27FC236}">
+                <a16:creationId xmlns:a16="http://schemas.microsoft.com/office/drawing/2014/main" id="{89B088FC-8E77-36D9-D8D0-F3619DE16E1A}"/>
+              </a:ext>
+            </a:extLst>
+          </p:cNvPr>
+          <p:cNvSpPr txBox="1">
+            <a:spLocks noGrp="1"/>
+          </p:cNvSpPr>
+          <p:nvPr>
+            <p:ph type="body" idx="4294967295"/>
+          </p:nvPr>
+        </p:nvSpPr>
+        <p:spPr>
+          <a:xfrm>
+            <a:off x="609600" y="892774"/>
+            <a:ext cx="10533321" cy="5486400"/>
+          </a:xfrm>
+          <a:prstGeom prst="rect">
+            <a:avLst/>
+          </a:prstGeom>
+        </p:spPr>
+        <p:txBody>
+          <a:bodyPr spcFirstLastPara="1" wrap="square" lIns="121900" tIns="121900" rIns="121900" bIns="121900" anchor="t" anchorCtr="0">
+            <a:noAutofit/>
+          </a:bodyPr>
+          <a:lstStyle/>
+          <a:p>
+            <a:pPr>
+              <a:buClr>
+                <a:schemeClr val="bg1"/>
+              </a:buClr>
+            </a:pPr>
+            <a:r>
+              <a:rPr lang="en-US" dirty="0">
+                <a:solidFill>
+                  <a:schemeClr val="bg1"/>
+                </a:solidFill>
+              </a:rPr>
+              <a:t>Observation:</a:t>
+            </a:r>
+          </a:p>
+          <a:p>
+            <a:pPr lvl="1">
+              <a:buClr>
+                <a:schemeClr val="bg1"/>
+              </a:buClr>
+            </a:pPr>
+            <a:r>
+              <a:rPr lang="en-US" dirty="0">
+                <a:solidFill>
+                  <a:schemeClr val="bg1"/>
+                </a:solidFill>
+              </a:rPr>
+              <a:t>Subsampling gave massive speedups but error climbed quickly (e.g. 4.5% at stride=4, 23% at stride=16).</a:t>
+            </a:r>
+          </a:p>
+          <a:p>
+            <a:pPr lvl="1">
+              <a:buClr>
+                <a:schemeClr val="bg1"/>
+              </a:buClr>
+            </a:pPr>
+            <a:r>
+              <a:rPr lang="en-US" dirty="0">
+                <a:solidFill>
+                  <a:schemeClr val="bg1"/>
+                </a:solidFill>
+              </a:rPr>
+              <a:t>ROM gave moderate speedup (418×) but much lower error (~1.3%).</a:t>
+            </a:r>
+          </a:p>
+          <a:p>
+            <a:pPr>
+              <a:buClr>
+                <a:schemeClr val="bg1"/>
+              </a:buClr>
+            </a:pPr>
+            <a:r>
+              <a:rPr lang="en-US" dirty="0">
+                <a:solidFill>
+                  <a:schemeClr val="bg1"/>
+                </a:solidFill>
+              </a:rPr>
+              <a:t>This shows a tradeoff:</a:t>
+            </a:r>
+          </a:p>
+          <a:p>
+            <a:pPr lvl="1">
+              <a:buClr>
+                <a:schemeClr val="bg1"/>
+              </a:buClr>
+            </a:pPr>
+            <a:r>
+              <a:rPr lang="en-US" dirty="0">
+                <a:solidFill>
+                  <a:schemeClr val="bg1"/>
+                </a:solidFill>
+              </a:rPr>
+              <a:t>Subsampling = fastest, less accurate.</a:t>
+            </a:r>
+          </a:p>
+          <a:p>
+            <a:pPr lvl="1">
+              <a:buClr>
+                <a:schemeClr val="bg1"/>
+              </a:buClr>
+            </a:pPr>
+            <a:r>
+              <a:rPr lang="en-US" dirty="0">
+                <a:solidFill>
+                  <a:schemeClr val="bg1"/>
+                </a:solidFill>
+              </a:rPr>
+              <a:t>ROM = slower, but more accurate.</a:t>
+            </a:r>
+          </a:p>
+          <a:p>
+            <a:pPr>
+              <a:buClr>
+                <a:schemeClr val="bg1"/>
+              </a:buClr>
+            </a:pPr>
+            <a:r>
+              <a:rPr lang="en-US" dirty="0">
+                <a:solidFill>
+                  <a:schemeClr val="bg1"/>
+                </a:solidFill>
+              </a:rPr>
+              <a:t>The interesting point: both methods target the same bottleneck (</a:t>
+            </a:r>
+            <a:r>
+              <a:rPr lang="en-US" dirty="0" err="1">
+                <a:solidFill>
+                  <a:schemeClr val="bg1"/>
+                </a:solidFill>
+              </a:rPr>
+              <a:t>get_damper</a:t>
+            </a:r>
+            <a:r>
+              <a:rPr lang="en-US" dirty="0">
+                <a:solidFill>
+                  <a:schemeClr val="bg1"/>
+                </a:solidFill>
+              </a:rPr>
+              <a:t>), but in different ways — one skips calls, the other compresses the system.</a:t>
+            </a:r>
+          </a:p>
+        </p:txBody>
+      </p:sp>
+    </p:spTree>
+    <p:extLst>
+      <p:ext uri="{BB962C8B-B14F-4D97-AF65-F5344CB8AC3E}">
+        <p14:creationId xmlns:p14="http://schemas.microsoft.com/office/powerpoint/2010/main" val="3653919500"/>
+      </p:ext>
+    </p:extLst>
+  </p:cSld>
+  <p:clrMapOvr>
+    <a:masterClrMapping/>
+  </p:clrMapOvr>
+  <mc:AlternateContent xmlns:mc="http://schemas.openxmlformats.org/markup-compatibility/2006" xmlns:p14="http://schemas.microsoft.com/office/powerpoint/2010/main">
+    <mc:Choice Requires="p14">
+      <p:transition p14:dur="0" advClick="0"/>
+    </mc:Choice>
+    <mc:Fallback xmlns="">
+      <p:transition advClick="0"/>
+    </mc:Fallback>
+  </mc:AlternateContent>
+</p:sld>
+</file>
+
 <file path=ppt/slides/slide2.xml><?xml version="1.0" encoding="utf-8"?>
 <p:sld xmlns:a="http://schemas.openxmlformats.org/drawingml/2006/main" xmlns:r="http://schemas.openxmlformats.org/officeDocument/2006/relationships" xmlns:p="http://schemas.openxmlformats.org/presentationml/2006/main">
   <p:cSld>
@@ -19830,7 +19008,7 @@
         <p:spPr>
           <a:xfrm>
             <a:off x="609600" y="1051601"/>
-            <a:ext cx="10972800" cy="4362179"/>
+            <a:ext cx="10972800" cy="4786911"/>
           </a:xfrm>
           <a:prstGeom prst="rect">
             <a:avLst/>
@@ -19930,7 +19108,7 @@
                 <a:cs typeface="Lato"/>
                 <a:sym typeface="Lato"/>
               </a:rPr>
-              <a:t>Can simple tools push FOM close to ROM performance?</a:t>
+              <a:t>Can simple computational tools push FOM close to ROM performance?</a:t>
             </a:r>
           </a:p>
           <a:p>
@@ -20796,288 +19974,6 @@
   <p:cSld>
     <p:spTree>
       <p:nvGrpSpPr>
-        <p:cNvPr id="1" name="Shape 156">
-          <a:extLst>
-            <a:ext uri="{FF2B5EF4-FFF2-40B4-BE49-F238E27FC236}">
-              <a16:creationId xmlns:a16="http://schemas.microsoft.com/office/drawing/2014/main" id="{062EFC7F-EC13-C06C-2562-F070E0E00563}"/>
-            </a:ext>
-          </a:extLst>
-        </p:cNvPr>
-        <p:cNvGrpSpPr/>
-        <p:nvPr/>
-      </p:nvGrpSpPr>
-      <p:grpSpPr>
-        <a:xfrm>
-          <a:off x="0" y="0"/>
-          <a:ext cx="0" cy="0"/>
-          <a:chOff x="0" y="0"/>
-          <a:chExt cx="0" cy="0"/>
-        </a:xfrm>
-      </p:grpSpPr>
-      <p:sp>
-        <p:nvSpPr>
-          <p:cNvPr id="157" name="Google Shape;157;p27">
-            <a:extLst>
-              <a:ext uri="{FF2B5EF4-FFF2-40B4-BE49-F238E27FC236}">
-                <a16:creationId xmlns:a16="http://schemas.microsoft.com/office/drawing/2014/main" id="{D00055DB-6A18-C1F0-C8E8-DF5D3A961D9C}"/>
-              </a:ext>
-            </a:extLst>
-          </p:cNvPr>
-          <p:cNvSpPr txBox="1">
-            <a:spLocks noGrp="1"/>
-          </p:cNvSpPr>
-          <p:nvPr>
-            <p:ph type="subTitle" idx="4294967295"/>
-          </p:nvPr>
-        </p:nvSpPr>
-        <p:spPr>
-          <a:xfrm>
-            <a:off x="0" y="0"/>
-            <a:ext cx="12192000" cy="1051600"/>
-          </a:xfrm>
-          <a:prstGeom prst="rect">
-            <a:avLst/>
-          </a:prstGeom>
-        </p:spPr>
-        <p:txBody>
-          <a:bodyPr spcFirstLastPara="1" wrap="square" lIns="121900" tIns="121900" rIns="121900" bIns="121900" anchor="t" anchorCtr="0">
-            <a:noAutofit/>
-          </a:bodyPr>
-          <a:lstStyle/>
-          <a:p>
-            <a:pPr marL="0" indent="0">
-              <a:spcBef>
-                <a:spcPts val="0"/>
-              </a:spcBef>
-              <a:buNone/>
-            </a:pPr>
-            <a:r>
-              <a:rPr lang="en-US" sz="5333" b="1" dirty="0">
-                <a:solidFill>
-                  <a:schemeClr val="lt1"/>
-                </a:solidFill>
-                <a:latin typeface="Raleway"/>
-                <a:ea typeface="Raleway"/>
-                <a:cs typeface="Raleway"/>
-                <a:sym typeface="Raleway"/>
-              </a:rPr>
-              <a:t>(</a:t>
-            </a:r>
-            <a:r>
-              <a:rPr lang="en-US" sz="5333" b="1" dirty="0" err="1">
-                <a:solidFill>
-                  <a:schemeClr val="lt1"/>
-                </a:solidFill>
-                <a:latin typeface="Raleway"/>
-                <a:ea typeface="Raleway"/>
-                <a:cs typeface="Raleway"/>
-                <a:sym typeface="Raleway"/>
-              </a:rPr>
-              <a:t>get_damper</a:t>
-            </a:r>
-            <a:r>
-              <a:rPr lang="en-US" sz="5333" b="1" dirty="0">
-                <a:solidFill>
-                  <a:schemeClr val="lt1"/>
-                </a:solidFill>
-                <a:latin typeface="Raleway"/>
-                <a:ea typeface="Raleway"/>
-                <a:cs typeface="Raleway"/>
-                <a:sym typeface="Raleway"/>
-              </a:rPr>
-              <a:t>) (2): results</a:t>
-            </a:r>
-            <a:endParaRPr lang="en-US" sz="3733" i="1" dirty="0">
-              <a:solidFill>
-                <a:schemeClr val="lt1"/>
-              </a:solidFill>
-              <a:latin typeface="Raleway"/>
-              <a:ea typeface="Raleway"/>
-              <a:cs typeface="Raleway"/>
-              <a:sym typeface="Raleway"/>
-            </a:endParaRPr>
-          </a:p>
-        </p:txBody>
-      </p:sp>
-      <p:sp>
-        <p:nvSpPr>
-          <p:cNvPr id="158" name="Google Shape;158;p27">
-            <a:extLst>
-              <a:ext uri="{FF2B5EF4-FFF2-40B4-BE49-F238E27FC236}">
-                <a16:creationId xmlns:a16="http://schemas.microsoft.com/office/drawing/2014/main" id="{89B088FC-8E77-36D9-D8D0-F3619DE16E1A}"/>
-              </a:ext>
-            </a:extLst>
-          </p:cNvPr>
-          <p:cNvSpPr txBox="1">
-            <a:spLocks noGrp="1"/>
-          </p:cNvSpPr>
-          <p:nvPr>
-            <p:ph type="body" idx="4294967295"/>
-          </p:nvPr>
-        </p:nvSpPr>
-        <p:spPr>
-          <a:xfrm>
-            <a:off x="609600" y="892774"/>
-            <a:ext cx="10533321" cy="5486400"/>
-          </a:xfrm>
-          <a:prstGeom prst="rect">
-            <a:avLst/>
-          </a:prstGeom>
-        </p:spPr>
-        <p:txBody>
-          <a:bodyPr spcFirstLastPara="1" wrap="square" lIns="121900" tIns="121900" rIns="121900" bIns="121900" anchor="t" anchorCtr="0">
-            <a:noAutofit/>
-          </a:bodyPr>
-          <a:lstStyle/>
-          <a:p>
-            <a:pPr>
-              <a:buClr>
-                <a:schemeClr val="bg1"/>
-              </a:buClr>
-            </a:pPr>
-            <a:r>
-              <a:rPr lang="en-US" dirty="0">
-                <a:solidFill>
-                  <a:schemeClr val="bg1"/>
-                </a:solidFill>
-              </a:rPr>
-              <a:t>Observation:</a:t>
-            </a:r>
-          </a:p>
-          <a:p>
-            <a:pPr lvl="1">
-              <a:buClr>
-                <a:schemeClr val="bg1"/>
-              </a:buClr>
-            </a:pPr>
-            <a:r>
-              <a:rPr lang="en-US" dirty="0">
-                <a:solidFill>
-                  <a:schemeClr val="bg1"/>
-                </a:solidFill>
-              </a:rPr>
-              <a:t>Subsampling gave massive speedups but error climbed quickly (e.g. 4.5% at stride=4, 23% at stride=16).</a:t>
-            </a:r>
-          </a:p>
-          <a:p>
-            <a:pPr lvl="1">
-              <a:buClr>
-                <a:schemeClr val="bg1"/>
-              </a:buClr>
-            </a:pPr>
-            <a:r>
-              <a:rPr lang="en-US" dirty="0">
-                <a:solidFill>
-                  <a:schemeClr val="bg1"/>
-                </a:solidFill>
-              </a:rPr>
-              <a:t>ROM gave moderate speedup (418×) but much lower error (~1.3%).</a:t>
-            </a:r>
-          </a:p>
-          <a:p>
-            <a:pPr>
-              <a:buClr>
-                <a:schemeClr val="bg1"/>
-              </a:buClr>
-            </a:pPr>
-            <a:r>
-              <a:rPr lang="en-US" dirty="0">
-                <a:solidFill>
-                  <a:schemeClr val="bg1"/>
-                </a:solidFill>
-              </a:rPr>
-              <a:t>This shows a tradeoff:</a:t>
-            </a:r>
-          </a:p>
-          <a:p>
-            <a:pPr lvl="1">
-              <a:buClr>
-                <a:schemeClr val="bg1"/>
-              </a:buClr>
-            </a:pPr>
-            <a:r>
-              <a:rPr lang="en-US" dirty="0">
-                <a:solidFill>
-                  <a:schemeClr val="bg1"/>
-                </a:solidFill>
-              </a:rPr>
-              <a:t>Subsampling = fastest, less accurate.</a:t>
-            </a:r>
-          </a:p>
-          <a:p>
-            <a:pPr lvl="1">
-              <a:buClr>
-                <a:schemeClr val="bg1"/>
-              </a:buClr>
-            </a:pPr>
-            <a:r>
-              <a:rPr lang="en-US" dirty="0">
-                <a:solidFill>
-                  <a:schemeClr val="bg1"/>
-                </a:solidFill>
-              </a:rPr>
-              <a:t>ROM = slower, but more accurate.</a:t>
-            </a:r>
-          </a:p>
-          <a:p>
-            <a:pPr>
-              <a:buClr>
-                <a:schemeClr val="bg1"/>
-              </a:buClr>
-            </a:pPr>
-            <a:r>
-              <a:rPr lang="en-US" dirty="0">
-                <a:solidFill>
-                  <a:schemeClr val="bg1"/>
-                </a:solidFill>
-              </a:rPr>
-              <a:t>The interesting point: both methods target the same bottleneck (</a:t>
-            </a:r>
-            <a:r>
-              <a:rPr lang="en-US" dirty="0" err="1">
-                <a:solidFill>
-                  <a:schemeClr val="bg1"/>
-                </a:solidFill>
-              </a:rPr>
-              <a:t>get_damper</a:t>
-            </a:r>
-            <a:r>
-              <a:rPr lang="en-US" dirty="0">
-                <a:solidFill>
-                  <a:schemeClr val="bg1"/>
-                </a:solidFill>
-              </a:rPr>
-              <a:t>), but in different ways — one skips calls, the other compresses the system.</a:t>
-            </a:r>
-          </a:p>
-        </p:txBody>
-      </p:sp>
-    </p:spTree>
-    <p:extLst>
-      <p:ext uri="{BB962C8B-B14F-4D97-AF65-F5344CB8AC3E}">
-        <p14:creationId xmlns:p14="http://schemas.microsoft.com/office/powerpoint/2010/main" val="3653919500"/>
-      </p:ext>
-    </p:extLst>
-  </p:cSld>
-  <p:clrMapOvr>
-    <a:masterClrMapping/>
-  </p:clrMapOvr>
-  <mc:AlternateContent xmlns:mc="http://schemas.openxmlformats.org/markup-compatibility/2006" xmlns:p14="http://schemas.microsoft.com/office/powerpoint/2010/main">
-    <mc:Choice Requires="p14">
-      <p:transition p14:dur="0" advClick="0"/>
-    </mc:Choice>
-    <mc:Fallback xmlns="">
-      <p:transition advClick="0"/>
-    </mc:Fallback>
-  </mc:AlternateContent>
-</p:sld>
-</file>
-
-<file path=ppt/slides/slide21.xml><?xml version="1.0" encoding="utf-8"?>
-<p:sld xmlns:a="http://schemas.openxmlformats.org/drawingml/2006/main" xmlns:r="http://schemas.openxmlformats.org/officeDocument/2006/relationships" xmlns:p="http://schemas.openxmlformats.org/presentationml/2006/main">
-  <p:cSld>
-    <p:spTree>
-      <p:nvGrpSpPr>
         <p:cNvPr id="1" name="Shape 162">
           <a:extLst>
             <a:ext uri="{FF2B5EF4-FFF2-40B4-BE49-F238E27FC236}">
@@ -21924,7 +20820,7 @@
 </p:sld>
 </file>
 
-<file path=ppt/slides/slide22.xml><?xml version="1.0" encoding="utf-8"?>
+<file path=ppt/slides/slide21.xml><?xml version="1.0" encoding="utf-8"?>
 <p:sld xmlns:a="http://schemas.openxmlformats.org/drawingml/2006/main" xmlns:r="http://schemas.openxmlformats.org/officeDocument/2006/relationships" xmlns:p="http://schemas.openxmlformats.org/presentationml/2006/main">
   <p:cSld>
     <p:spTree>
@@ -22897,7 +21793,7 @@
 </p:sld>
 </file>
 
-<file path=ppt/slides/slide23.xml><?xml version="1.0" encoding="utf-8"?>
+<file path=ppt/slides/slide22.xml><?xml version="1.0" encoding="utf-8"?>
 <p:sld xmlns:a="http://schemas.openxmlformats.org/drawingml/2006/main" xmlns:r="http://schemas.openxmlformats.org/officeDocument/2006/relationships" xmlns:p="http://schemas.openxmlformats.org/presentationml/2006/main">
   <p:cSld>
     <p:spTree>
@@ -23334,7 +22230,7 @@
 </p:sld>
 </file>
 
-<file path=ppt/slides/slide24.xml><?xml version="1.0" encoding="utf-8"?>
+<file path=ppt/slides/slide23.xml><?xml version="1.0" encoding="utf-8"?>
 <p:sld xmlns:a="http://schemas.openxmlformats.org/drawingml/2006/main" xmlns:r="http://schemas.openxmlformats.org/officeDocument/2006/relationships" xmlns:p="http://schemas.openxmlformats.org/presentationml/2006/main">
   <p:cSld>
     <p:spTree>
@@ -24550,7 +23446,7 @@
 </p:sld>
 </file>
 
-<file path=ppt/slides/slide25.xml><?xml version="1.0" encoding="utf-8"?>
+<file path=ppt/slides/slide24.xml><?xml version="1.0" encoding="utf-8"?>
 <p:sld xmlns:a="http://schemas.openxmlformats.org/drawingml/2006/main" xmlns:r="http://schemas.openxmlformats.org/officeDocument/2006/relationships" xmlns:p="http://schemas.openxmlformats.org/presentationml/2006/main">
   <p:cSld>
     <p:spTree>
@@ -27097,749 +25993,6 @@
 </file>
 
 <file path=ppt/slides/slide5.xml><?xml version="1.0" encoding="utf-8"?>
-<p:sld xmlns:a="http://schemas.openxmlformats.org/drawingml/2006/main" xmlns:r="http://schemas.openxmlformats.org/officeDocument/2006/relationships" xmlns:p="http://schemas.openxmlformats.org/presentationml/2006/main" show="0">
-  <p:cSld>
-    <p:spTree>
-      <p:nvGrpSpPr>
-        <p:cNvPr id="1" name="Shape 162">
-          <a:extLst>
-            <a:ext uri="{FF2B5EF4-FFF2-40B4-BE49-F238E27FC236}">
-              <a16:creationId xmlns:a16="http://schemas.microsoft.com/office/drawing/2014/main" id="{35857836-FEDF-FB59-2663-E228BB30549B}"/>
-            </a:ext>
-          </a:extLst>
-        </p:cNvPr>
-        <p:cNvGrpSpPr/>
-        <p:nvPr/>
-      </p:nvGrpSpPr>
-      <p:grpSpPr>
-        <a:xfrm>
-          <a:off x="0" y="0"/>
-          <a:ext cx="0" cy="0"/>
-          <a:chOff x="0" y="0"/>
-          <a:chExt cx="0" cy="0"/>
-        </a:xfrm>
-      </p:grpSpPr>
-      <p:sp>
-        <p:nvSpPr>
-          <p:cNvPr id="164" name="Google Shape;164;p28">
-            <a:extLst>
-              <a:ext uri="{FF2B5EF4-FFF2-40B4-BE49-F238E27FC236}">
-                <a16:creationId xmlns:a16="http://schemas.microsoft.com/office/drawing/2014/main" id="{313264B7-476E-0068-E770-5C04B565756D}"/>
-              </a:ext>
-            </a:extLst>
-          </p:cNvPr>
-          <p:cNvSpPr txBox="1"/>
-          <p:nvPr/>
-        </p:nvSpPr>
-        <p:spPr>
-          <a:xfrm>
-            <a:off x="609600" y="1051601"/>
-            <a:ext cx="10972800" cy="2882800"/>
-          </a:xfrm>
-          <a:prstGeom prst="rect">
-            <a:avLst/>
-          </a:prstGeom>
-          <a:noFill/>
-          <a:ln>
-            <a:noFill/>
-          </a:ln>
-        </p:spPr>
-        <p:txBody>
-          <a:bodyPr spcFirstLastPara="1" wrap="square" lIns="121900" tIns="121900" rIns="121900" bIns="121900" anchor="t" anchorCtr="0">
-            <a:spAutoFit/>
-          </a:bodyPr>
-          <a:lstStyle/>
-          <a:p>
-            <a:pPr marL="609585" indent="-465655" defTabSz="1219170">
-              <a:lnSpc>
-                <a:spcPct val="115000"/>
-              </a:lnSpc>
-              <a:spcAft>
-                <a:spcPts val="800"/>
-              </a:spcAft>
-              <a:buClr>
-                <a:srgbClr val="434343"/>
-              </a:buClr>
-              <a:buSzPct val="100000"/>
-              <a:buFont typeface="Lato"/>
-              <a:buChar char="▷"/>
-            </a:pPr>
-            <a:r>
-              <a:rPr lang="en-US" sz="2400" b="1" dirty="0">
-                <a:solidFill>
-                  <a:schemeClr val="tx2">
-                    <a:lumMod val="10000"/>
-                  </a:schemeClr>
-                </a:solidFill>
-                <a:latin typeface="Lato" panose="020F0502020204030203" pitchFamily="34" charset="0"/>
-                <a:ea typeface="Lato" panose="020F0502020204030203" pitchFamily="34" charset="0"/>
-                <a:cs typeface="Lato" panose="020F0502020204030203" pitchFamily="34" charset="0"/>
-              </a:rPr>
-              <a:t>POD snapshots: </a:t>
-            </a:r>
-            <a:r>
-              <a:rPr lang="en-US" sz="2400" dirty="0">
-                <a:solidFill>
-                  <a:schemeClr val="tx2">
-                    <a:lumMod val="10000"/>
-                  </a:schemeClr>
-                </a:solidFill>
-                <a:latin typeface="Lato" panose="020F0502020204030203" pitchFamily="34" charset="0"/>
-                <a:ea typeface="Lato" panose="020F0502020204030203" pitchFamily="34" charset="0"/>
-                <a:cs typeface="Lato" panose="020F0502020204030203" pitchFamily="34" charset="0"/>
-              </a:rPr>
-              <a:t>augmented tumor maps for temporal variation.</a:t>
-            </a:r>
-          </a:p>
-          <a:p>
-            <a:pPr marL="609585" indent="-465655" defTabSz="1219170">
-              <a:lnSpc>
-                <a:spcPct val="115000"/>
-              </a:lnSpc>
-              <a:spcAft>
-                <a:spcPts val="800"/>
-              </a:spcAft>
-              <a:buClr>
-                <a:srgbClr val="434343"/>
-              </a:buClr>
-              <a:buSzPct val="100000"/>
-              <a:buFont typeface="Lato"/>
-              <a:buChar char="▷"/>
-            </a:pPr>
-            <a:r>
-              <a:rPr lang="en-US" sz="2400" b="1" dirty="0">
-                <a:solidFill>
-                  <a:schemeClr val="tx2">
-                    <a:lumMod val="10000"/>
-                  </a:schemeClr>
-                </a:solidFill>
-                <a:latin typeface="Lato" panose="020F0502020204030203" pitchFamily="34" charset="0"/>
-                <a:ea typeface="Lato" panose="020F0502020204030203" pitchFamily="34" charset="0"/>
-                <a:cs typeface="Lato" panose="020F0502020204030203" pitchFamily="34" charset="0"/>
-              </a:rPr>
-              <a:t>Reduced operators: </a:t>
-            </a:r>
-            <a:r>
-              <a:rPr lang="en-US" sz="2400" dirty="0">
-                <a:solidFill>
-                  <a:schemeClr val="tx2">
-                    <a:lumMod val="10000"/>
-                  </a:schemeClr>
-                </a:solidFill>
-                <a:latin typeface="Lato" panose="020F0502020204030203" pitchFamily="34" charset="0"/>
-                <a:ea typeface="Lato" panose="020F0502020204030203" pitchFamily="34" charset="0"/>
-                <a:cs typeface="Lato" panose="020F0502020204030203" pitchFamily="34" charset="0"/>
-              </a:rPr>
-              <a:t>reduced gradient and stress mappings.</a:t>
-            </a:r>
-          </a:p>
-          <a:p>
-            <a:pPr marL="609585" indent="-465655" defTabSz="1219170">
-              <a:lnSpc>
-                <a:spcPct val="115000"/>
-              </a:lnSpc>
-              <a:spcAft>
-                <a:spcPts val="800"/>
-              </a:spcAft>
-              <a:buClr>
-                <a:srgbClr val="434343"/>
-              </a:buClr>
-              <a:buSzPct val="100000"/>
-              <a:buFont typeface="Lato"/>
-              <a:buChar char="▷"/>
-            </a:pPr>
-            <a:r>
-              <a:rPr lang="en-US" sz="2400" b="1" dirty="0">
-                <a:solidFill>
-                  <a:schemeClr val="tx2">
-                    <a:lumMod val="10000"/>
-                  </a:schemeClr>
-                </a:solidFill>
-                <a:latin typeface="Lato" panose="020F0502020204030203" pitchFamily="34" charset="0"/>
-                <a:ea typeface="Lato" panose="020F0502020204030203" pitchFamily="34" charset="0"/>
-                <a:cs typeface="Lato" panose="020F0502020204030203" pitchFamily="34" charset="0"/>
-              </a:rPr>
-              <a:t>Use case: </a:t>
-            </a:r>
-            <a:r>
-              <a:rPr lang="en-US" sz="2400" dirty="0">
-                <a:solidFill>
-                  <a:schemeClr val="tx2">
-                    <a:lumMod val="10000"/>
-                  </a:schemeClr>
-                </a:solidFill>
-                <a:latin typeface="Lato" panose="020F0502020204030203" pitchFamily="34" charset="0"/>
-                <a:ea typeface="Lato" panose="020F0502020204030203" pitchFamily="34" charset="0"/>
-                <a:cs typeface="Lato" panose="020F0502020204030203" pitchFamily="34" charset="0"/>
-              </a:rPr>
-              <a:t>lower-dimensional solves for consistent accuracy.</a:t>
-            </a:r>
-          </a:p>
-          <a:p>
-            <a:pPr marL="609585" indent="-465655" defTabSz="1219170">
-              <a:lnSpc>
-                <a:spcPct val="115000"/>
-              </a:lnSpc>
-              <a:spcAft>
-                <a:spcPts val="800"/>
-              </a:spcAft>
-              <a:buClr>
-                <a:srgbClr val="434343"/>
-              </a:buClr>
-              <a:buSzPct val="100000"/>
-              <a:buFont typeface="Lato"/>
-              <a:buChar char="▷"/>
-            </a:pPr>
-            <a:endParaRPr lang="en-US" sz="2400" dirty="0">
-              <a:solidFill>
-                <a:schemeClr val="tx2">
-                  <a:lumMod val="10000"/>
-                </a:schemeClr>
-              </a:solidFill>
-              <a:latin typeface="Lato" panose="020F0502020204030203" pitchFamily="34" charset="0"/>
-              <a:ea typeface="Lato" panose="020F0502020204030203" pitchFamily="34" charset="0"/>
-              <a:cs typeface="Lato" panose="020F0502020204030203" pitchFamily="34" charset="0"/>
-            </a:endParaRPr>
-          </a:p>
-          <a:p>
-            <a:pPr marL="609585" indent="-465655" defTabSz="1219170">
-              <a:lnSpc>
-                <a:spcPct val="115000"/>
-              </a:lnSpc>
-              <a:spcAft>
-                <a:spcPts val="800"/>
-              </a:spcAft>
-              <a:buClr>
-                <a:srgbClr val="434343"/>
-              </a:buClr>
-              <a:buSzPct val="100000"/>
-              <a:buFont typeface="Lato"/>
-              <a:buChar char="▷"/>
-            </a:pPr>
-            <a:endParaRPr lang="en-US" sz="2400" dirty="0">
-              <a:solidFill>
-                <a:schemeClr val="tx2">
-                  <a:lumMod val="10000"/>
-                </a:schemeClr>
-              </a:solidFill>
-              <a:latin typeface="Lato" panose="020F0502020204030203" pitchFamily="34" charset="0"/>
-              <a:ea typeface="Lato" panose="020F0502020204030203" pitchFamily="34" charset="0"/>
-              <a:cs typeface="Lato" panose="020F0502020204030203" pitchFamily="34" charset="0"/>
-            </a:endParaRPr>
-          </a:p>
-        </p:txBody>
-      </p:sp>
-      <p:sp>
-        <p:nvSpPr>
-          <p:cNvPr id="4" name="Google Shape;157;p27">
-            <a:extLst>
-              <a:ext uri="{FF2B5EF4-FFF2-40B4-BE49-F238E27FC236}">
-                <a16:creationId xmlns:a16="http://schemas.microsoft.com/office/drawing/2014/main" id="{A5339AB4-ABD4-AEA6-ECF1-8F3911DDE854}"/>
-              </a:ext>
-            </a:extLst>
-          </p:cNvPr>
-          <p:cNvSpPr txBox="1">
-            <a:spLocks/>
-          </p:cNvSpPr>
-          <p:nvPr/>
-        </p:nvSpPr>
-        <p:spPr>
-          <a:xfrm>
-            <a:off x="0" y="0"/>
-            <a:ext cx="12192000" cy="1051600"/>
-          </a:xfrm>
-          <a:prstGeom prst="rect">
-            <a:avLst/>
-          </a:prstGeom>
-          <a:noFill/>
-          <a:ln>
-            <a:noFill/>
-          </a:ln>
-        </p:spPr>
-        <p:txBody>
-          <a:bodyPr spcFirstLastPara="1" wrap="square" lIns="121900" tIns="121900" rIns="121900" bIns="121900" anchor="t" anchorCtr="0">
-            <a:noAutofit/>
-          </a:bodyPr>
-          <a:lstStyle>
-            <a:defPPr marR="0" lvl="0" algn="l" rtl="0">
-              <a:lnSpc>
-                <a:spcPct val="100000"/>
-              </a:lnSpc>
-              <a:spcBef>
-                <a:spcPts val="0"/>
-              </a:spcBef>
-              <a:spcAft>
-                <a:spcPts val="0"/>
-              </a:spcAft>
-            </a:defPPr>
-            <a:lvl1pPr marL="457200" marR="0" lvl="0" indent="-381000" algn="l" rtl="0">
-              <a:lnSpc>
-                <a:spcPct val="100000"/>
-              </a:lnSpc>
-              <a:spcBef>
-                <a:spcPts val="600"/>
-              </a:spcBef>
-              <a:spcAft>
-                <a:spcPts val="0"/>
-              </a:spcAft>
-              <a:buClr>
-                <a:schemeClr val="accent6"/>
-              </a:buClr>
-              <a:buSzPts val="2400"/>
-              <a:buFont typeface="Lato"/>
-              <a:buChar char="▷"/>
-              <a:defRPr sz="2400" b="0" i="0" u="none" strike="noStrike" cap="none">
-                <a:solidFill>
-                  <a:schemeClr val="dk1"/>
-                </a:solidFill>
-                <a:latin typeface="Lato"/>
-                <a:ea typeface="Lato"/>
-                <a:cs typeface="Lato"/>
-                <a:sym typeface="Lato"/>
-              </a:defRPr>
-            </a:lvl1pPr>
-            <a:lvl2pPr marL="914400" marR="0" lvl="1" indent="-381000" algn="l" rtl="0">
-              <a:lnSpc>
-                <a:spcPct val="100000"/>
-              </a:lnSpc>
-              <a:spcBef>
-                <a:spcPts val="0"/>
-              </a:spcBef>
-              <a:spcAft>
-                <a:spcPts val="0"/>
-              </a:spcAft>
-              <a:buClr>
-                <a:schemeClr val="dk1"/>
-              </a:buClr>
-              <a:buSzPts val="2400"/>
-              <a:buFont typeface="Lato"/>
-              <a:buChar char="○"/>
-              <a:defRPr sz="2400" b="0" i="0" u="none" strike="noStrike" cap="none">
-                <a:solidFill>
-                  <a:schemeClr val="dk1"/>
-                </a:solidFill>
-                <a:latin typeface="Lato"/>
-                <a:ea typeface="Lato"/>
-                <a:cs typeface="Lato"/>
-                <a:sym typeface="Lato"/>
-              </a:defRPr>
-            </a:lvl2pPr>
-            <a:lvl3pPr marL="1371600" marR="0" lvl="2" indent="-381000" algn="l" rtl="0">
-              <a:lnSpc>
-                <a:spcPct val="100000"/>
-              </a:lnSpc>
-              <a:spcBef>
-                <a:spcPts val="0"/>
-              </a:spcBef>
-              <a:spcAft>
-                <a:spcPts val="0"/>
-              </a:spcAft>
-              <a:buClr>
-                <a:schemeClr val="dk1"/>
-              </a:buClr>
-              <a:buSzPts val="2400"/>
-              <a:buFont typeface="Lato"/>
-              <a:buChar char="■"/>
-              <a:defRPr sz="2400" b="0" i="0" u="none" strike="noStrike" cap="none">
-                <a:solidFill>
-                  <a:schemeClr val="dk1"/>
-                </a:solidFill>
-                <a:latin typeface="Lato"/>
-                <a:ea typeface="Lato"/>
-                <a:cs typeface="Lato"/>
-                <a:sym typeface="Lato"/>
-              </a:defRPr>
-            </a:lvl3pPr>
-            <a:lvl4pPr marL="1828800" marR="0" lvl="3" indent="-381000" algn="l" rtl="0">
-              <a:lnSpc>
-                <a:spcPct val="100000"/>
-              </a:lnSpc>
-              <a:spcBef>
-                <a:spcPts val="0"/>
-              </a:spcBef>
-              <a:spcAft>
-                <a:spcPts val="0"/>
-              </a:spcAft>
-              <a:buClr>
-                <a:schemeClr val="dk1"/>
-              </a:buClr>
-              <a:buSzPts val="2400"/>
-              <a:buFont typeface="Lato"/>
-              <a:buChar char="●"/>
-              <a:defRPr sz="2400" b="0" i="0" u="none" strike="noStrike" cap="none">
-                <a:solidFill>
-                  <a:schemeClr val="dk1"/>
-                </a:solidFill>
-                <a:latin typeface="Lato"/>
-                <a:ea typeface="Lato"/>
-                <a:cs typeface="Lato"/>
-                <a:sym typeface="Lato"/>
-              </a:defRPr>
-            </a:lvl4pPr>
-            <a:lvl5pPr marL="2286000" marR="0" lvl="4" indent="-381000" algn="l" rtl="0">
-              <a:lnSpc>
-                <a:spcPct val="100000"/>
-              </a:lnSpc>
-              <a:spcBef>
-                <a:spcPts val="0"/>
-              </a:spcBef>
-              <a:spcAft>
-                <a:spcPts val="0"/>
-              </a:spcAft>
-              <a:buClr>
-                <a:schemeClr val="dk1"/>
-              </a:buClr>
-              <a:buSzPts val="2400"/>
-              <a:buFont typeface="Lato"/>
-              <a:buChar char="○"/>
-              <a:defRPr sz="2400" b="0" i="0" u="none" strike="noStrike" cap="none">
-                <a:solidFill>
-                  <a:schemeClr val="dk1"/>
-                </a:solidFill>
-                <a:latin typeface="Lato"/>
-                <a:ea typeface="Lato"/>
-                <a:cs typeface="Lato"/>
-                <a:sym typeface="Lato"/>
-              </a:defRPr>
-            </a:lvl5pPr>
-            <a:lvl6pPr marL="2743200" marR="0" lvl="5" indent="-381000" algn="l" rtl="0">
-              <a:lnSpc>
-                <a:spcPct val="100000"/>
-              </a:lnSpc>
-              <a:spcBef>
-                <a:spcPts val="0"/>
-              </a:spcBef>
-              <a:spcAft>
-                <a:spcPts val="0"/>
-              </a:spcAft>
-              <a:buClr>
-                <a:schemeClr val="dk1"/>
-              </a:buClr>
-              <a:buSzPts val="2400"/>
-              <a:buFont typeface="Lato"/>
-              <a:buChar char="■"/>
-              <a:defRPr sz="2400" b="0" i="0" u="none" strike="noStrike" cap="none">
-                <a:solidFill>
-                  <a:schemeClr val="dk1"/>
-                </a:solidFill>
-                <a:latin typeface="Lato"/>
-                <a:ea typeface="Lato"/>
-                <a:cs typeface="Lato"/>
-                <a:sym typeface="Lato"/>
-              </a:defRPr>
-            </a:lvl6pPr>
-            <a:lvl7pPr marL="3200400" marR="0" lvl="6" indent="-381000" algn="l" rtl="0">
-              <a:lnSpc>
-                <a:spcPct val="100000"/>
-              </a:lnSpc>
-              <a:spcBef>
-                <a:spcPts val="0"/>
-              </a:spcBef>
-              <a:spcAft>
-                <a:spcPts val="0"/>
-              </a:spcAft>
-              <a:buClr>
-                <a:schemeClr val="dk1"/>
-              </a:buClr>
-              <a:buSzPts val="2400"/>
-              <a:buFont typeface="Lato"/>
-              <a:buChar char="●"/>
-              <a:defRPr sz="2400" b="0" i="0" u="none" strike="noStrike" cap="none">
-                <a:solidFill>
-                  <a:schemeClr val="dk1"/>
-                </a:solidFill>
-                <a:latin typeface="Lato"/>
-                <a:ea typeface="Lato"/>
-                <a:cs typeface="Lato"/>
-                <a:sym typeface="Lato"/>
-              </a:defRPr>
-            </a:lvl7pPr>
-            <a:lvl8pPr marL="3657600" marR="0" lvl="7" indent="-381000" algn="l" rtl="0">
-              <a:lnSpc>
-                <a:spcPct val="100000"/>
-              </a:lnSpc>
-              <a:spcBef>
-                <a:spcPts val="0"/>
-              </a:spcBef>
-              <a:spcAft>
-                <a:spcPts val="0"/>
-              </a:spcAft>
-              <a:buClr>
-                <a:schemeClr val="dk1"/>
-              </a:buClr>
-              <a:buSzPts val="2400"/>
-              <a:buFont typeface="Lato"/>
-              <a:buChar char="○"/>
-              <a:defRPr sz="2400" b="0" i="0" u="none" strike="noStrike" cap="none">
-                <a:solidFill>
-                  <a:schemeClr val="dk1"/>
-                </a:solidFill>
-                <a:latin typeface="Lato"/>
-                <a:ea typeface="Lato"/>
-                <a:cs typeface="Lato"/>
-                <a:sym typeface="Lato"/>
-              </a:defRPr>
-            </a:lvl8pPr>
-            <a:lvl9pPr marL="4114800" marR="0" lvl="8" indent="-381000" algn="l" rtl="0">
-              <a:lnSpc>
-                <a:spcPct val="100000"/>
-              </a:lnSpc>
-              <a:spcBef>
-                <a:spcPts val="0"/>
-              </a:spcBef>
-              <a:spcAft>
-                <a:spcPts val="0"/>
-              </a:spcAft>
-              <a:buClr>
-                <a:schemeClr val="dk1"/>
-              </a:buClr>
-              <a:buSzPts val="2400"/>
-              <a:buFont typeface="Lato"/>
-              <a:buChar char="■"/>
-              <a:defRPr sz="2400" b="0" i="0" u="none" strike="noStrike" cap="none">
-                <a:solidFill>
-                  <a:schemeClr val="dk1"/>
-                </a:solidFill>
-                <a:latin typeface="Lato"/>
-                <a:ea typeface="Lato"/>
-                <a:cs typeface="Lato"/>
-                <a:sym typeface="Lato"/>
-              </a:defRPr>
-            </a:lvl9pPr>
-          </a:lstStyle>
-          <a:p>
-            <a:pPr marL="0" indent="0" defTabSz="1219170">
-              <a:spcBef>
-                <a:spcPts val="0"/>
-              </a:spcBef>
-              <a:buClr>
-                <a:srgbClr val="97ABBC"/>
-              </a:buClr>
-              <a:buNone/>
-            </a:pPr>
-            <a:r>
-              <a:rPr lang="en-US" sz="5333" b="1" kern="0" dirty="0">
-                <a:solidFill>
-                  <a:srgbClr val="2185C5"/>
-                </a:solidFill>
-                <a:latin typeface="Raleway"/>
-                <a:ea typeface="Raleway"/>
-                <a:cs typeface="Raleway"/>
-                <a:sym typeface="Raleway"/>
-              </a:rPr>
-              <a:t>Reduced Order Modeling (ROM)</a:t>
-            </a:r>
-            <a:endParaRPr lang="en-US" sz="3733" i="1" kern="0" dirty="0">
-              <a:solidFill>
-                <a:srgbClr val="2185C5"/>
-              </a:solidFill>
-              <a:latin typeface="Raleway"/>
-              <a:ea typeface="Raleway"/>
-              <a:cs typeface="Raleway"/>
-              <a:sym typeface="Raleway"/>
-            </a:endParaRPr>
-          </a:p>
-        </p:txBody>
-      </p:sp>
-    </p:spTree>
-    <p:extLst>
-      <p:ext uri="{BB962C8B-B14F-4D97-AF65-F5344CB8AC3E}">
-        <p14:creationId xmlns:p14="http://schemas.microsoft.com/office/powerpoint/2010/main" val="3748834620"/>
-      </p:ext>
-    </p:extLst>
-  </p:cSld>
-  <p:clrMapOvr>
-    <a:masterClrMapping/>
-  </p:clrMapOvr>
-  <mc:AlternateContent xmlns:mc="http://schemas.openxmlformats.org/markup-compatibility/2006">
-    <mc:Choice xmlns:p14="http://schemas.microsoft.com/office/powerpoint/2010/main" Requires="p14">
-      <p:transition p14:dur="0" advClick="0"/>
-    </mc:Choice>
-    <mc:Fallback>
-      <p:transition advClick="0"/>
-    </mc:Fallback>
-  </mc:AlternateContent>
-  <p:timing>
-    <p:tnLst>
-      <p:par>
-        <p:cTn id="1" dur="indefinite" restart="never" nodeType="tmRoot">
-          <p:childTnLst>
-            <p:seq concurrent="1" nextAc="seek">
-              <p:cTn id="2" dur="indefinite" nodeType="mainSeq">
-                <p:childTnLst>
-                  <p:par>
-                    <p:cTn id="3" fill="hold">
-                      <p:stCondLst>
-                        <p:cond delay="indefinite"/>
-                      </p:stCondLst>
-                      <p:childTnLst>
-                        <p:par>
-                          <p:cTn id="4" fill="hold">
-                            <p:stCondLst>
-                              <p:cond delay="0"/>
-                            </p:stCondLst>
-                            <p:childTnLst>
-                              <p:par>
-                                <p:cTn id="5" presetID="1" presetClass="entr" presetSubtype="0" fill="hold" nodeType="clickEffect">
-                                  <p:stCondLst>
-                                    <p:cond delay="0"/>
-                                  </p:stCondLst>
-                                  <p:childTnLst>
-                                    <p:set>
-                                      <p:cBhvr>
-                                        <p:cTn id="6" dur="1" fill="hold">
-                                          <p:stCondLst>
-                                            <p:cond delay="0"/>
-                                          </p:stCondLst>
-                                        </p:cTn>
-                                        <p:tgtEl>
-                                          <p:spTgt spid="164">
-                                            <p:txEl>
-                                              <p:pRg st="0" end="0"/>
-                                            </p:txEl>
-                                          </p:spTgt>
-                                        </p:tgtEl>
-                                        <p:attrNameLst>
-                                          <p:attrName>style.visibility</p:attrName>
-                                        </p:attrNameLst>
-                                      </p:cBhvr>
-                                      <p:to>
-                                        <p:strVal val="visible"/>
-                                      </p:to>
-                                    </p:set>
-                                  </p:childTnLst>
-                                </p:cTn>
-                              </p:par>
-                            </p:childTnLst>
-                          </p:cTn>
-                        </p:par>
-                      </p:childTnLst>
-                    </p:cTn>
-                  </p:par>
-                  <p:par>
-                    <p:cTn id="7" fill="hold">
-                      <p:stCondLst>
-                        <p:cond delay="indefinite"/>
-                      </p:stCondLst>
-                      <p:childTnLst>
-                        <p:par>
-                          <p:cTn id="8" fill="hold">
-                            <p:stCondLst>
-                              <p:cond delay="0"/>
-                            </p:stCondLst>
-                            <p:childTnLst>
-                              <p:par>
-                                <p:cTn id="9" presetID="1" presetClass="entr" presetSubtype="0" fill="hold" nodeType="clickEffect">
-                                  <p:stCondLst>
-                                    <p:cond delay="0"/>
-                                  </p:stCondLst>
-                                  <p:childTnLst>
-                                    <p:set>
-                                      <p:cBhvr>
-                                        <p:cTn id="10" dur="1" fill="hold">
-                                          <p:stCondLst>
-                                            <p:cond delay="0"/>
-                                          </p:stCondLst>
-                                        </p:cTn>
-                                        <p:tgtEl>
-                                          <p:spTgt spid="164">
-                                            <p:txEl>
-                                              <p:pRg st="1" end="1"/>
-                                            </p:txEl>
-                                          </p:spTgt>
-                                        </p:tgtEl>
-                                        <p:attrNameLst>
-                                          <p:attrName>style.visibility</p:attrName>
-                                        </p:attrNameLst>
-                                      </p:cBhvr>
-                                      <p:to>
-                                        <p:strVal val="visible"/>
-                                      </p:to>
-                                    </p:set>
-                                  </p:childTnLst>
-                                </p:cTn>
-                              </p:par>
-                            </p:childTnLst>
-                          </p:cTn>
-                        </p:par>
-                      </p:childTnLst>
-                    </p:cTn>
-                  </p:par>
-                  <p:par>
-                    <p:cTn id="11" fill="hold">
-                      <p:stCondLst>
-                        <p:cond delay="indefinite"/>
-                      </p:stCondLst>
-                      <p:childTnLst>
-                        <p:par>
-                          <p:cTn id="12" fill="hold">
-                            <p:stCondLst>
-                              <p:cond delay="0"/>
-                            </p:stCondLst>
-                            <p:childTnLst>
-                              <p:par>
-                                <p:cTn id="13" presetID="1" presetClass="entr" presetSubtype="0" fill="hold" nodeType="clickEffect">
-                                  <p:stCondLst>
-                                    <p:cond delay="0"/>
-                                  </p:stCondLst>
-                                  <p:childTnLst>
-                                    <p:set>
-                                      <p:cBhvr>
-                                        <p:cTn id="14" dur="1" fill="hold">
-                                          <p:stCondLst>
-                                            <p:cond delay="0"/>
-                                          </p:stCondLst>
-                                        </p:cTn>
-                                        <p:tgtEl>
-                                          <p:spTgt spid="164">
-                                            <p:txEl>
-                                              <p:pRg st="2" end="2"/>
-                                            </p:txEl>
-                                          </p:spTgt>
-                                        </p:tgtEl>
-                                        <p:attrNameLst>
-                                          <p:attrName>style.visibility</p:attrName>
-                                        </p:attrNameLst>
-                                      </p:cBhvr>
-                                      <p:to>
-                                        <p:strVal val="visible"/>
-                                      </p:to>
-                                    </p:set>
-                                  </p:childTnLst>
-                                </p:cTn>
-                              </p:par>
-                            </p:childTnLst>
-                          </p:cTn>
-                        </p:par>
-                      </p:childTnLst>
-                    </p:cTn>
-                  </p:par>
-                </p:childTnLst>
-              </p:cTn>
-              <p:prevCondLst>
-                <p:cond evt="onPrev" delay="0">
-                  <p:tgtEl>
-                    <p:sldTgt/>
-                  </p:tgtEl>
-                </p:cond>
-              </p:prevCondLst>
-              <p:nextCondLst>
-                <p:cond evt="onNext" delay="0">
-                  <p:tgtEl>
-                    <p:sldTgt/>
-                  </p:tgtEl>
-                </p:cond>
-              </p:nextCondLst>
-            </p:seq>
-          </p:childTnLst>
-        </p:cTn>
-      </p:par>
-    </p:tnLst>
-  </p:timing>
-</p:sld>
-</file>
-
-<file path=ppt/slides/slide6.xml><?xml version="1.0" encoding="utf-8"?>
 <p:sld xmlns:a="http://schemas.openxmlformats.org/drawingml/2006/main" xmlns:r="http://schemas.openxmlformats.org/officeDocument/2006/relationships" xmlns:p="http://schemas.openxmlformats.org/presentationml/2006/main">
   <p:cSld>
     <p:spTree>
@@ -28582,7 +26735,7 @@
 </p:sld>
 </file>
 
-<file path=ppt/slides/slide7.xml><?xml version="1.0" encoding="utf-8"?>
+<file path=ppt/slides/slide6.xml><?xml version="1.0" encoding="utf-8"?>
 <p:sld xmlns:a="http://schemas.openxmlformats.org/drawingml/2006/main" xmlns:r="http://schemas.openxmlformats.org/officeDocument/2006/relationships" xmlns:p="http://schemas.openxmlformats.org/presentationml/2006/main">
   <p:cSld>
     <p:spTree>
@@ -29429,7 +27582,7 @@
 </p:sld>
 </file>
 
-<file path=ppt/slides/slide8.xml><?xml version="1.0" encoding="utf-8"?>
+<file path=ppt/slides/slide7.xml><?xml version="1.0" encoding="utf-8"?>
 <p:sld xmlns:a="http://schemas.openxmlformats.org/drawingml/2006/main" xmlns:r="http://schemas.openxmlformats.org/officeDocument/2006/relationships" xmlns:p="http://schemas.openxmlformats.org/presentationml/2006/main">
   <p:cSld>
     <p:spTree>
@@ -30650,7 +28803,7 @@
 </p:sld>
 </file>
 
-<file path=ppt/slides/slide9.xml><?xml version="1.0" encoding="utf-8"?>
+<file path=ppt/slides/slide8.xml><?xml version="1.0" encoding="utf-8"?>
 <p:sld xmlns:a="http://schemas.openxmlformats.org/drawingml/2006/main" xmlns:r="http://schemas.openxmlformats.org/officeDocument/2006/relationships" xmlns:p="http://schemas.openxmlformats.org/presentationml/2006/main">
   <p:cSld>
     <p:spTree>
@@ -31076,6 +29229,973 @@
     <p:extLst>
       <p:ext uri="{BB962C8B-B14F-4D97-AF65-F5344CB8AC3E}">
         <p14:creationId xmlns:p14="http://schemas.microsoft.com/office/powerpoint/2010/main" val="3591361699"/>
+      </p:ext>
+    </p:extLst>
+  </p:cSld>
+  <p:clrMapOvr>
+    <a:masterClrMapping/>
+  </p:clrMapOvr>
+  <mc:AlternateContent xmlns:mc="http://schemas.openxmlformats.org/markup-compatibility/2006" xmlns:p14="http://schemas.microsoft.com/office/powerpoint/2010/main">
+    <mc:Choice Requires="p14">
+      <p:transition p14:dur="0" advClick="0"/>
+    </mc:Choice>
+    <mc:Fallback xmlns="">
+      <p:transition advClick="0"/>
+    </mc:Fallback>
+  </mc:AlternateContent>
+</p:sld>
+</file>
+
+<file path=ppt/slides/slide9.xml><?xml version="1.0" encoding="utf-8"?>
+<p:sld xmlns:a="http://schemas.openxmlformats.org/drawingml/2006/main" xmlns:r="http://schemas.openxmlformats.org/officeDocument/2006/relationships" xmlns:p="http://schemas.openxmlformats.org/presentationml/2006/main">
+  <p:cSld>
+    <p:spTree>
+      <p:nvGrpSpPr>
+        <p:cNvPr id="1" name="Shape 162">
+          <a:extLst>
+            <a:ext uri="{FF2B5EF4-FFF2-40B4-BE49-F238E27FC236}">
+              <a16:creationId xmlns:a16="http://schemas.microsoft.com/office/drawing/2014/main" id="{4FA340A7-6C37-F1ED-B3AC-F8963A79175F}"/>
+            </a:ext>
+          </a:extLst>
+        </p:cNvPr>
+        <p:cNvGrpSpPr/>
+        <p:nvPr/>
+      </p:nvGrpSpPr>
+      <p:grpSpPr>
+        <a:xfrm>
+          <a:off x="0" y="0"/>
+          <a:ext cx="0" cy="0"/>
+          <a:chOff x="0" y="0"/>
+          <a:chExt cx="0" cy="0"/>
+        </a:xfrm>
+      </p:grpSpPr>
+      <p:sp>
+        <p:nvSpPr>
+          <p:cNvPr id="4" name="Google Shape;157;p27">
+            <a:extLst>
+              <a:ext uri="{FF2B5EF4-FFF2-40B4-BE49-F238E27FC236}">
+                <a16:creationId xmlns:a16="http://schemas.microsoft.com/office/drawing/2014/main" id="{AD92CB79-9F3C-6BEA-5457-3953A5D099AF}"/>
+              </a:ext>
+            </a:extLst>
+          </p:cNvPr>
+          <p:cNvSpPr txBox="1">
+            <a:spLocks/>
+          </p:cNvSpPr>
+          <p:nvPr/>
+        </p:nvSpPr>
+        <p:spPr>
+          <a:xfrm>
+            <a:off x="0" y="0"/>
+            <a:ext cx="12192000" cy="1051600"/>
+          </a:xfrm>
+          <a:prstGeom prst="rect">
+            <a:avLst/>
+          </a:prstGeom>
+          <a:noFill/>
+          <a:ln>
+            <a:noFill/>
+          </a:ln>
+        </p:spPr>
+        <p:txBody>
+          <a:bodyPr spcFirstLastPara="1" wrap="square" lIns="121900" tIns="121900" rIns="121900" bIns="121900" anchor="t" anchorCtr="0">
+            <a:noAutofit/>
+          </a:bodyPr>
+          <a:lstStyle>
+            <a:defPPr marR="0" lvl="0" algn="l" rtl="0">
+              <a:lnSpc>
+                <a:spcPct val="100000"/>
+              </a:lnSpc>
+              <a:spcBef>
+                <a:spcPts val="0"/>
+              </a:spcBef>
+              <a:spcAft>
+                <a:spcPts val="0"/>
+              </a:spcAft>
+            </a:defPPr>
+            <a:lvl1pPr marL="457200" marR="0" lvl="0" indent="-381000" algn="l" rtl="0">
+              <a:lnSpc>
+                <a:spcPct val="100000"/>
+              </a:lnSpc>
+              <a:spcBef>
+                <a:spcPts val="600"/>
+              </a:spcBef>
+              <a:spcAft>
+                <a:spcPts val="0"/>
+              </a:spcAft>
+              <a:buClr>
+                <a:schemeClr val="accent6"/>
+              </a:buClr>
+              <a:buSzPts val="2400"/>
+              <a:buFont typeface="Lato"/>
+              <a:buChar char="▷"/>
+              <a:defRPr sz="2400" b="0" i="0" u="none" strike="noStrike" cap="none">
+                <a:solidFill>
+                  <a:schemeClr val="dk1"/>
+                </a:solidFill>
+                <a:latin typeface="Lato"/>
+                <a:ea typeface="Lato"/>
+                <a:cs typeface="Lato"/>
+                <a:sym typeface="Lato"/>
+              </a:defRPr>
+            </a:lvl1pPr>
+            <a:lvl2pPr marL="914400" marR="0" lvl="1" indent="-381000" algn="l" rtl="0">
+              <a:lnSpc>
+                <a:spcPct val="100000"/>
+              </a:lnSpc>
+              <a:spcBef>
+                <a:spcPts val="0"/>
+              </a:spcBef>
+              <a:spcAft>
+                <a:spcPts val="0"/>
+              </a:spcAft>
+              <a:buClr>
+                <a:schemeClr val="dk1"/>
+              </a:buClr>
+              <a:buSzPts val="2400"/>
+              <a:buFont typeface="Lato"/>
+              <a:buChar char="○"/>
+              <a:defRPr sz="2400" b="0" i="0" u="none" strike="noStrike" cap="none">
+                <a:solidFill>
+                  <a:schemeClr val="dk1"/>
+                </a:solidFill>
+                <a:latin typeface="Lato"/>
+                <a:ea typeface="Lato"/>
+                <a:cs typeface="Lato"/>
+                <a:sym typeface="Lato"/>
+              </a:defRPr>
+            </a:lvl2pPr>
+            <a:lvl3pPr marL="1371600" marR="0" lvl="2" indent="-381000" algn="l" rtl="0">
+              <a:lnSpc>
+                <a:spcPct val="100000"/>
+              </a:lnSpc>
+              <a:spcBef>
+                <a:spcPts val="0"/>
+              </a:spcBef>
+              <a:spcAft>
+                <a:spcPts val="0"/>
+              </a:spcAft>
+              <a:buClr>
+                <a:schemeClr val="dk1"/>
+              </a:buClr>
+              <a:buSzPts val="2400"/>
+              <a:buFont typeface="Lato"/>
+              <a:buChar char="■"/>
+              <a:defRPr sz="2400" b="0" i="0" u="none" strike="noStrike" cap="none">
+                <a:solidFill>
+                  <a:schemeClr val="dk1"/>
+                </a:solidFill>
+                <a:latin typeface="Lato"/>
+                <a:ea typeface="Lato"/>
+                <a:cs typeface="Lato"/>
+                <a:sym typeface="Lato"/>
+              </a:defRPr>
+            </a:lvl3pPr>
+            <a:lvl4pPr marL="1828800" marR="0" lvl="3" indent="-381000" algn="l" rtl="0">
+              <a:lnSpc>
+                <a:spcPct val="100000"/>
+              </a:lnSpc>
+              <a:spcBef>
+                <a:spcPts val="0"/>
+              </a:spcBef>
+              <a:spcAft>
+                <a:spcPts val="0"/>
+              </a:spcAft>
+              <a:buClr>
+                <a:schemeClr val="dk1"/>
+              </a:buClr>
+              <a:buSzPts val="2400"/>
+              <a:buFont typeface="Lato"/>
+              <a:buChar char="●"/>
+              <a:defRPr sz="2400" b="0" i="0" u="none" strike="noStrike" cap="none">
+                <a:solidFill>
+                  <a:schemeClr val="dk1"/>
+                </a:solidFill>
+                <a:latin typeface="Lato"/>
+                <a:ea typeface="Lato"/>
+                <a:cs typeface="Lato"/>
+                <a:sym typeface="Lato"/>
+              </a:defRPr>
+            </a:lvl4pPr>
+            <a:lvl5pPr marL="2286000" marR="0" lvl="4" indent="-381000" algn="l" rtl="0">
+              <a:lnSpc>
+                <a:spcPct val="100000"/>
+              </a:lnSpc>
+              <a:spcBef>
+                <a:spcPts val="0"/>
+              </a:spcBef>
+              <a:spcAft>
+                <a:spcPts val="0"/>
+              </a:spcAft>
+              <a:buClr>
+                <a:schemeClr val="dk1"/>
+              </a:buClr>
+              <a:buSzPts val="2400"/>
+              <a:buFont typeface="Lato"/>
+              <a:buChar char="○"/>
+              <a:defRPr sz="2400" b="0" i="0" u="none" strike="noStrike" cap="none">
+                <a:solidFill>
+                  <a:schemeClr val="dk1"/>
+                </a:solidFill>
+                <a:latin typeface="Lato"/>
+                <a:ea typeface="Lato"/>
+                <a:cs typeface="Lato"/>
+                <a:sym typeface="Lato"/>
+              </a:defRPr>
+            </a:lvl5pPr>
+            <a:lvl6pPr marL="2743200" marR="0" lvl="5" indent="-381000" algn="l" rtl="0">
+              <a:lnSpc>
+                <a:spcPct val="100000"/>
+              </a:lnSpc>
+              <a:spcBef>
+                <a:spcPts val="0"/>
+              </a:spcBef>
+              <a:spcAft>
+                <a:spcPts val="0"/>
+              </a:spcAft>
+              <a:buClr>
+                <a:schemeClr val="dk1"/>
+              </a:buClr>
+              <a:buSzPts val="2400"/>
+              <a:buFont typeface="Lato"/>
+              <a:buChar char="■"/>
+              <a:defRPr sz="2400" b="0" i="0" u="none" strike="noStrike" cap="none">
+                <a:solidFill>
+                  <a:schemeClr val="dk1"/>
+                </a:solidFill>
+                <a:latin typeface="Lato"/>
+                <a:ea typeface="Lato"/>
+                <a:cs typeface="Lato"/>
+                <a:sym typeface="Lato"/>
+              </a:defRPr>
+            </a:lvl6pPr>
+            <a:lvl7pPr marL="3200400" marR="0" lvl="6" indent="-381000" algn="l" rtl="0">
+              <a:lnSpc>
+                <a:spcPct val="100000"/>
+              </a:lnSpc>
+              <a:spcBef>
+                <a:spcPts val="0"/>
+              </a:spcBef>
+              <a:spcAft>
+                <a:spcPts val="0"/>
+              </a:spcAft>
+              <a:buClr>
+                <a:schemeClr val="dk1"/>
+              </a:buClr>
+              <a:buSzPts val="2400"/>
+              <a:buFont typeface="Lato"/>
+              <a:buChar char="●"/>
+              <a:defRPr sz="2400" b="0" i="0" u="none" strike="noStrike" cap="none">
+                <a:solidFill>
+                  <a:schemeClr val="dk1"/>
+                </a:solidFill>
+                <a:latin typeface="Lato"/>
+                <a:ea typeface="Lato"/>
+                <a:cs typeface="Lato"/>
+                <a:sym typeface="Lato"/>
+              </a:defRPr>
+            </a:lvl7pPr>
+            <a:lvl8pPr marL="3657600" marR="0" lvl="7" indent="-381000" algn="l" rtl="0">
+              <a:lnSpc>
+                <a:spcPct val="100000"/>
+              </a:lnSpc>
+              <a:spcBef>
+                <a:spcPts val="0"/>
+              </a:spcBef>
+              <a:spcAft>
+                <a:spcPts val="0"/>
+              </a:spcAft>
+              <a:buClr>
+                <a:schemeClr val="dk1"/>
+              </a:buClr>
+              <a:buSzPts val="2400"/>
+              <a:buFont typeface="Lato"/>
+              <a:buChar char="○"/>
+              <a:defRPr sz="2400" b="0" i="0" u="none" strike="noStrike" cap="none">
+                <a:solidFill>
+                  <a:schemeClr val="dk1"/>
+                </a:solidFill>
+                <a:latin typeface="Lato"/>
+                <a:ea typeface="Lato"/>
+                <a:cs typeface="Lato"/>
+                <a:sym typeface="Lato"/>
+              </a:defRPr>
+            </a:lvl8pPr>
+            <a:lvl9pPr marL="4114800" marR="0" lvl="8" indent="-381000" algn="l" rtl="0">
+              <a:lnSpc>
+                <a:spcPct val="100000"/>
+              </a:lnSpc>
+              <a:spcBef>
+                <a:spcPts val="0"/>
+              </a:spcBef>
+              <a:spcAft>
+                <a:spcPts val="0"/>
+              </a:spcAft>
+              <a:buClr>
+                <a:schemeClr val="dk1"/>
+              </a:buClr>
+              <a:buSzPts val="2400"/>
+              <a:buFont typeface="Lato"/>
+              <a:buChar char="■"/>
+              <a:defRPr sz="2400" b="0" i="0" u="none" strike="noStrike" cap="none">
+                <a:solidFill>
+                  <a:schemeClr val="dk1"/>
+                </a:solidFill>
+                <a:latin typeface="Lato"/>
+                <a:ea typeface="Lato"/>
+                <a:cs typeface="Lato"/>
+                <a:sym typeface="Lato"/>
+              </a:defRPr>
+            </a:lvl9pPr>
+          </a:lstStyle>
+          <a:p>
+            <a:pPr marL="0" indent="0" defTabSz="1219170">
+              <a:spcBef>
+                <a:spcPts val="0"/>
+              </a:spcBef>
+              <a:buClr>
+                <a:srgbClr val="97ABBC"/>
+              </a:buClr>
+              <a:buNone/>
+            </a:pPr>
+            <a:r>
+              <a:rPr lang="en-US" sz="5333" b="1" kern="0" dirty="0">
+                <a:solidFill>
+                  <a:srgbClr val="2185C5"/>
+                </a:solidFill>
+                <a:latin typeface="Raleway"/>
+                <a:ea typeface="Raleway"/>
+                <a:cs typeface="Raleway"/>
+                <a:sym typeface="Raleway"/>
+              </a:rPr>
+              <a:t>Results: Figure 2</a:t>
+            </a:r>
+            <a:endParaRPr lang="en-US" sz="3733" i="1" kern="0" dirty="0">
+              <a:solidFill>
+                <a:srgbClr val="2185C5"/>
+              </a:solidFill>
+              <a:latin typeface="Raleway"/>
+              <a:ea typeface="Raleway"/>
+              <a:cs typeface="Raleway"/>
+              <a:sym typeface="Raleway"/>
+            </a:endParaRPr>
+          </a:p>
+        </p:txBody>
+      </p:sp>
+      <p:sp>
+        <p:nvSpPr>
+          <p:cNvPr id="6" name="TextBox 5">
+            <a:extLst>
+              <a:ext uri="{FF2B5EF4-FFF2-40B4-BE49-F238E27FC236}">
+                <a16:creationId xmlns:a16="http://schemas.microsoft.com/office/drawing/2014/main" id="{42D75E7F-957E-9085-ED42-9979E878E07C}"/>
+              </a:ext>
+            </a:extLst>
+          </p:cNvPr>
+          <p:cNvSpPr txBox="1"/>
+          <p:nvPr/>
+        </p:nvSpPr>
+        <p:spPr>
+          <a:xfrm>
+            <a:off x="1338696" y="5750098"/>
+            <a:ext cx="10955482" cy="646331"/>
+          </a:xfrm>
+          <a:prstGeom prst="rect">
+            <a:avLst/>
+          </a:prstGeom>
+          <a:noFill/>
+        </p:spPr>
+        <p:txBody>
+          <a:bodyPr wrap="square">
+            <a:spAutoFit/>
+          </a:bodyPr>
+          <a:lstStyle/>
+          <a:p>
+            <a:r>
+              <a:rPr lang="en-US" b="1" dirty="0">
+                <a:solidFill>
+                  <a:schemeClr val="tx2">
+                    <a:lumMod val="10000"/>
+                  </a:schemeClr>
+                </a:solidFill>
+                <a:latin typeface="Lato" panose="020F0502020204030203" pitchFamily="34" charset="0"/>
+                <a:ea typeface="Lato" panose="020F0502020204030203" pitchFamily="34" charset="0"/>
+                <a:cs typeface="Lato" panose="020F0502020204030203" pitchFamily="34" charset="0"/>
+              </a:rPr>
+              <a:t>Figure 2:</a:t>
+            </a:r>
+            <a:r>
+              <a:rPr lang="en-US" dirty="0">
+                <a:solidFill>
+                  <a:schemeClr val="tx2">
+                    <a:lumMod val="10000"/>
+                  </a:schemeClr>
+                </a:solidFill>
+                <a:latin typeface="Lato" panose="020F0502020204030203" pitchFamily="34" charset="0"/>
+                <a:ea typeface="Lato" panose="020F0502020204030203" pitchFamily="34" charset="0"/>
+                <a:cs typeface="Lato" panose="020F0502020204030203" pitchFamily="34" charset="0"/>
+              </a:rPr>
+              <a:t> Tradeoff curve — error rises with stride; speedup increases (S=16 ~6000×); ROM shown as reference (~2% error, ~4500× speedup).</a:t>
+            </a:r>
+          </a:p>
+        </p:txBody>
+      </p:sp>
+      <p:pic>
+        <p:nvPicPr>
+          <p:cNvPr id="5" name="Picture 4">
+            <a:extLst>
+              <a:ext uri="{FF2B5EF4-FFF2-40B4-BE49-F238E27FC236}">
+                <a16:creationId xmlns:a16="http://schemas.microsoft.com/office/drawing/2014/main" id="{444365F8-FFF2-CF9E-DEB2-0A67F080E235}"/>
+              </a:ext>
+            </a:extLst>
+          </p:cNvPr>
+          <p:cNvPicPr>
+            <a:picLocks noChangeAspect="1"/>
+          </p:cNvPicPr>
+          <p:nvPr/>
+        </p:nvPicPr>
+        <p:blipFill rotWithShape="1">
+          <a:blip r:embed="rId3"/>
+          <a:srcRect l="7490" r="3634"/>
+          <a:stretch>
+            <a:fillRect/>
+          </a:stretch>
+        </p:blipFill>
+        <p:spPr bwMode="auto">
+          <a:xfrm>
+            <a:off x="1172440" y="1093165"/>
+            <a:ext cx="9190759" cy="4825757"/>
+          </a:xfrm>
+          <a:prstGeom prst="rect">
+            <a:avLst/>
+          </a:prstGeom>
+          <a:ln>
+            <a:noFill/>
+          </a:ln>
+          <a:extLst>
+            <a:ext uri="{53640926-AAD7-44D8-BBD7-CCE9431645EC}">
+              <a14:shadowObscured xmlns:a14="http://schemas.microsoft.com/office/drawing/2010/main"/>
+            </a:ext>
+          </a:extLst>
+        </p:spPr>
+      </p:pic>
+      <mc:AlternateContent xmlns:mc="http://schemas.openxmlformats.org/markup-compatibility/2006">
+        <mc:Choice xmlns:a14="http://schemas.microsoft.com/office/drawing/2010/main" Requires="a14">
+          <p:sp>
+            <p:nvSpPr>
+              <p:cNvPr id="7" name="TextBox 6">
+                <a:extLst>
+                  <a:ext uri="{FF2B5EF4-FFF2-40B4-BE49-F238E27FC236}">
+                    <a16:creationId xmlns:a16="http://schemas.microsoft.com/office/drawing/2014/main" id="{A5D8D122-45F1-CFDF-77CC-BCE2EB37E480}"/>
+                  </a:ext>
+                </a:extLst>
+              </p:cNvPr>
+              <p:cNvSpPr txBox="1"/>
+              <p:nvPr/>
+            </p:nvSpPr>
+            <p:spPr>
+              <a:xfrm>
+                <a:off x="9663546" y="180725"/>
+                <a:ext cx="2357889" cy="561692"/>
+              </a:xfrm>
+              <a:prstGeom prst="rect">
+                <a:avLst/>
+              </a:prstGeom>
+              <a:noFill/>
+            </p:spPr>
+            <p:txBody>
+              <a:bodyPr wrap="none" lIns="0" tIns="0" rIns="0" bIns="0" rtlCol="0">
+                <a:spAutoFit/>
+              </a:bodyPr>
+              <a:lstStyle/>
+              <a:p>
+                <a:pPr/>
+                <a14:m>
+                  <m:oMathPara xmlns:m="http://schemas.openxmlformats.org/officeDocument/2006/math">
+                    <m:oMathParaPr>
+                      <m:jc m:val="centerGroup"/>
+                    </m:oMathParaPr>
+                    <m:oMath xmlns:m="http://schemas.openxmlformats.org/officeDocument/2006/math">
+                      <m:sSub>
+                        <m:sSubPr>
+                          <m:ctrlPr>
+                            <a:rPr lang="en-US" sz="1400" i="1" smtClean="0">
+                              <a:solidFill>
+                                <a:schemeClr val="tx2">
+                                  <a:lumMod val="10000"/>
+                                </a:schemeClr>
+                              </a:solidFill>
+                              <a:latin typeface="Cambria Math" panose="02040503050406030204" pitchFamily="18" charset="0"/>
+                            </a:rPr>
+                          </m:ctrlPr>
+                        </m:sSubPr>
+                        <m:e>
+                          <m:r>
+                            <a:rPr lang="en-US" sz="1400" b="0" i="1" smtClean="0">
+                              <a:solidFill>
+                                <a:schemeClr val="tx2">
+                                  <a:lumMod val="10000"/>
+                                </a:schemeClr>
+                              </a:solidFill>
+                              <a:latin typeface="Cambria Math" panose="02040503050406030204" pitchFamily="18" charset="0"/>
+                            </a:rPr>
+                            <m:t>𝐸𝑟𝑟𝑜𝑟</m:t>
+                          </m:r>
+                        </m:e>
+                        <m:sub>
+                          <m:r>
+                            <a:rPr lang="en-US" sz="1400" b="0" i="1" smtClean="0">
+                              <a:solidFill>
+                                <a:schemeClr val="tx2">
+                                  <a:lumMod val="10000"/>
+                                </a:schemeClr>
+                              </a:solidFill>
+                              <a:latin typeface="Cambria Math" panose="02040503050406030204" pitchFamily="18" charset="0"/>
+                            </a:rPr>
+                            <m:t>𝑖</m:t>
+                          </m:r>
+                        </m:sub>
+                      </m:sSub>
+                      <m:r>
+                        <a:rPr lang="en-US" sz="1400" b="0" i="1" smtClean="0">
+                          <a:solidFill>
+                            <a:schemeClr val="tx2">
+                              <a:lumMod val="10000"/>
+                            </a:schemeClr>
+                          </a:solidFill>
+                          <a:latin typeface="Cambria Math" panose="02040503050406030204" pitchFamily="18" charset="0"/>
+                        </a:rPr>
+                        <m:t>=</m:t>
+                      </m:r>
+                      <m:f>
+                        <m:fPr>
+                          <m:ctrlPr>
+                            <a:rPr lang="en-US" sz="1400" i="1" smtClean="0">
+                              <a:solidFill>
+                                <a:schemeClr val="tx2">
+                                  <a:lumMod val="10000"/>
+                                </a:schemeClr>
+                              </a:solidFill>
+                              <a:latin typeface="Cambria Math" panose="02040503050406030204" pitchFamily="18" charset="0"/>
+                            </a:rPr>
+                          </m:ctrlPr>
+                        </m:fPr>
+                        <m:num>
+                          <m:d>
+                            <m:dPr>
+                              <m:begChr m:val="‖"/>
+                              <m:endChr m:val="‖"/>
+                              <m:ctrlPr>
+                                <a:rPr lang="en-US" sz="1400" i="1" smtClean="0">
+                                  <a:solidFill>
+                                    <a:schemeClr val="tx2">
+                                      <a:lumMod val="10000"/>
+                                    </a:schemeClr>
+                                  </a:solidFill>
+                                  <a:latin typeface="Cambria Math" panose="02040503050406030204" pitchFamily="18" charset="0"/>
+                                </a:rPr>
+                              </m:ctrlPr>
+                            </m:dPr>
+                            <m:e>
+                              <m:sSubSup>
+                                <m:sSubSupPr>
+                                  <m:ctrlPr>
+                                    <a:rPr lang="en-US" sz="1400" i="1" smtClean="0">
+                                      <a:solidFill>
+                                        <a:schemeClr val="tx2">
+                                          <a:lumMod val="10000"/>
+                                        </a:schemeClr>
+                                      </a:solidFill>
+                                      <a:latin typeface="Cambria Math" panose="02040503050406030204" pitchFamily="18" charset="0"/>
+                                    </a:rPr>
+                                  </m:ctrlPr>
+                                </m:sSubSupPr>
+                                <m:e>
+                                  <m:r>
+                                    <a:rPr lang="en-US" sz="1400" i="1" smtClean="0">
+                                      <a:solidFill>
+                                        <a:schemeClr val="tx2">
+                                          <a:lumMod val="10000"/>
+                                        </a:schemeClr>
+                                      </a:solidFill>
+                                      <a:latin typeface="Cambria Math" panose="02040503050406030204" pitchFamily="18" charset="0"/>
+                                      <a:ea typeface="Cambria Math" panose="02040503050406030204" pitchFamily="18" charset="0"/>
+                                    </a:rPr>
+                                    <m:t>𝜎</m:t>
+                                  </m:r>
+                                </m:e>
+                                <m:sub>
+                                  <m:r>
+                                    <a:rPr lang="en-US" sz="1400" b="0" i="1" smtClean="0">
+                                      <a:solidFill>
+                                        <a:schemeClr val="tx2">
+                                          <a:lumMod val="10000"/>
+                                        </a:schemeClr>
+                                      </a:solidFill>
+                                      <a:latin typeface="Cambria Math" panose="02040503050406030204" pitchFamily="18" charset="0"/>
+                                    </a:rPr>
+                                    <m:t>𝑣𝑚</m:t>
+                                  </m:r>
+                                </m:sub>
+                                <m:sup>
+                                  <m:r>
+                                    <a:rPr lang="en-US" sz="1400" b="0" i="1" smtClean="0">
+                                      <a:solidFill>
+                                        <a:schemeClr val="tx2">
+                                          <a:lumMod val="10000"/>
+                                        </a:schemeClr>
+                                      </a:solidFill>
+                                      <a:latin typeface="Cambria Math" panose="02040503050406030204" pitchFamily="18" charset="0"/>
+                                    </a:rPr>
+                                    <m:t>𝑓𝑢𝑙𝑙</m:t>
+                                  </m:r>
+                                </m:sup>
+                              </m:sSubSup>
+                              <m:r>
+                                <a:rPr lang="en-US" sz="1400" b="0" i="1" smtClean="0">
+                                  <a:solidFill>
+                                    <a:schemeClr val="tx2">
+                                      <a:lumMod val="10000"/>
+                                    </a:schemeClr>
+                                  </a:solidFill>
+                                  <a:latin typeface="Cambria Math" panose="02040503050406030204" pitchFamily="18" charset="0"/>
+                                </a:rPr>
+                                <m:t>(</m:t>
+                              </m:r>
+                              <m:r>
+                                <a:rPr lang="en-US" sz="1400" b="0" i="1" smtClean="0">
+                                  <a:solidFill>
+                                    <a:schemeClr val="tx2">
+                                      <a:lumMod val="10000"/>
+                                    </a:schemeClr>
+                                  </a:solidFill>
+                                  <a:latin typeface="Cambria Math" panose="02040503050406030204" pitchFamily="18" charset="0"/>
+                                </a:rPr>
+                                <m:t>𝑖</m:t>
+                              </m:r>
+                              <m:r>
+                                <a:rPr lang="en-US" sz="1400" b="0" i="1" smtClean="0">
+                                  <a:solidFill>
+                                    <a:schemeClr val="tx2">
+                                      <a:lumMod val="10000"/>
+                                    </a:schemeClr>
+                                  </a:solidFill>
+                                  <a:latin typeface="Cambria Math" panose="02040503050406030204" pitchFamily="18" charset="0"/>
+                                </a:rPr>
+                                <m:t>)−</m:t>
+                              </m:r>
+                              <m:sSubSup>
+                                <m:sSubSupPr>
+                                  <m:ctrlPr>
+                                    <a:rPr lang="en-US" sz="1400" i="1">
+                                      <a:solidFill>
+                                        <a:schemeClr val="tx2">
+                                          <a:lumMod val="10000"/>
+                                        </a:schemeClr>
+                                      </a:solidFill>
+                                      <a:latin typeface="Cambria Math" panose="02040503050406030204" pitchFamily="18" charset="0"/>
+                                    </a:rPr>
+                                  </m:ctrlPr>
+                                </m:sSubSupPr>
+                                <m:e>
+                                  <m:r>
+                                    <a:rPr lang="en-US" sz="1400" i="1">
+                                      <a:solidFill>
+                                        <a:schemeClr val="tx2">
+                                          <a:lumMod val="10000"/>
+                                        </a:schemeClr>
+                                      </a:solidFill>
+                                      <a:latin typeface="Cambria Math" panose="02040503050406030204" pitchFamily="18" charset="0"/>
+                                      <a:ea typeface="Cambria Math" panose="02040503050406030204" pitchFamily="18" charset="0"/>
+                                    </a:rPr>
+                                    <m:t>𝜎</m:t>
+                                  </m:r>
+                                </m:e>
+                                <m:sub>
+                                  <m:r>
+                                    <a:rPr lang="en-US" sz="1400" i="1">
+                                      <a:solidFill>
+                                        <a:schemeClr val="tx2">
+                                          <a:lumMod val="10000"/>
+                                        </a:schemeClr>
+                                      </a:solidFill>
+                                      <a:latin typeface="Cambria Math" panose="02040503050406030204" pitchFamily="18" charset="0"/>
+                                    </a:rPr>
+                                    <m:t>𝑣𝑚</m:t>
+                                  </m:r>
+                                </m:sub>
+                                <m:sup>
+                                  <m:r>
+                                    <a:rPr lang="en-US" sz="1400" b="0" i="1" smtClean="0">
+                                      <a:solidFill>
+                                        <a:schemeClr val="tx2">
+                                          <a:lumMod val="10000"/>
+                                        </a:schemeClr>
+                                      </a:solidFill>
+                                      <a:latin typeface="Cambria Math" panose="02040503050406030204" pitchFamily="18" charset="0"/>
+                                    </a:rPr>
+                                    <m:t>𝑠𝑢𝑏</m:t>
+                                  </m:r>
+                                </m:sup>
+                              </m:sSubSup>
+                              <m:r>
+                                <a:rPr lang="en-US" sz="1400" b="0" i="1" smtClean="0">
+                                  <a:solidFill>
+                                    <a:schemeClr val="tx2">
+                                      <a:lumMod val="10000"/>
+                                    </a:schemeClr>
+                                  </a:solidFill>
+                                  <a:latin typeface="Cambria Math" panose="02040503050406030204" pitchFamily="18" charset="0"/>
+                                </a:rPr>
+                                <m:t>(</m:t>
+                              </m:r>
+                              <m:r>
+                                <a:rPr lang="en-US" sz="1400" b="0" i="1" smtClean="0">
+                                  <a:solidFill>
+                                    <a:schemeClr val="tx2">
+                                      <a:lumMod val="10000"/>
+                                    </a:schemeClr>
+                                  </a:solidFill>
+                                  <a:latin typeface="Cambria Math" panose="02040503050406030204" pitchFamily="18" charset="0"/>
+                                </a:rPr>
+                                <m:t>𝑖</m:t>
+                              </m:r>
+                              <m:r>
+                                <a:rPr lang="en-US" sz="1400" b="0" i="1" smtClean="0">
+                                  <a:solidFill>
+                                    <a:schemeClr val="tx2">
+                                      <a:lumMod val="10000"/>
+                                    </a:schemeClr>
+                                  </a:solidFill>
+                                  <a:latin typeface="Cambria Math" panose="02040503050406030204" pitchFamily="18" charset="0"/>
+                                </a:rPr>
+                                <m:t>)</m:t>
+                              </m:r>
+                            </m:e>
+                          </m:d>
+                        </m:num>
+                        <m:den>
+                          <m:r>
+                            <m:rPr>
+                              <m:sty m:val="p"/>
+                            </m:rPr>
+                            <a:rPr lang="en-US" sz="1400" b="0" i="0" smtClean="0">
+                              <a:solidFill>
+                                <a:schemeClr val="tx2">
+                                  <a:lumMod val="10000"/>
+                                </a:schemeClr>
+                              </a:solidFill>
+                              <a:latin typeface="Cambria Math" panose="02040503050406030204" pitchFamily="18" charset="0"/>
+                            </a:rPr>
+                            <m:t>max</m:t>
+                          </m:r>
+                          <m:r>
+                            <a:rPr lang="en-US" sz="1400" b="0" i="1" smtClean="0">
+                              <a:solidFill>
+                                <a:schemeClr val="tx2">
+                                  <a:lumMod val="10000"/>
+                                </a:schemeClr>
+                              </a:solidFill>
+                              <a:latin typeface="Cambria Math" panose="02040503050406030204" pitchFamily="18" charset="0"/>
+                            </a:rPr>
+                            <m:t>⁡(</m:t>
+                          </m:r>
+                          <m:d>
+                            <m:dPr>
+                              <m:begChr m:val="‖"/>
+                              <m:endChr m:val="‖"/>
+                              <m:ctrlPr>
+                                <a:rPr lang="en-US" sz="1400" b="0" i="1" smtClean="0">
+                                  <a:solidFill>
+                                    <a:schemeClr val="tx2">
+                                      <a:lumMod val="10000"/>
+                                    </a:schemeClr>
+                                  </a:solidFill>
+                                  <a:latin typeface="Cambria Math" panose="02040503050406030204" pitchFamily="18" charset="0"/>
+                                </a:rPr>
+                              </m:ctrlPr>
+                            </m:dPr>
+                            <m:e>
+                              <m:sSubSup>
+                                <m:sSubSupPr>
+                                  <m:ctrlPr>
+                                    <a:rPr lang="en-US" sz="1400" i="1">
+                                      <a:solidFill>
+                                        <a:schemeClr val="tx2">
+                                          <a:lumMod val="10000"/>
+                                        </a:schemeClr>
+                                      </a:solidFill>
+                                      <a:latin typeface="Cambria Math" panose="02040503050406030204" pitchFamily="18" charset="0"/>
+                                    </a:rPr>
+                                  </m:ctrlPr>
+                                </m:sSubSupPr>
+                                <m:e>
+                                  <m:r>
+                                    <a:rPr lang="en-US" sz="1400" i="1">
+                                      <a:solidFill>
+                                        <a:schemeClr val="tx2">
+                                          <a:lumMod val="10000"/>
+                                        </a:schemeClr>
+                                      </a:solidFill>
+                                      <a:latin typeface="Cambria Math" panose="02040503050406030204" pitchFamily="18" charset="0"/>
+                                      <a:ea typeface="Cambria Math" panose="02040503050406030204" pitchFamily="18" charset="0"/>
+                                    </a:rPr>
+                                    <m:t>𝜎</m:t>
+                                  </m:r>
+                                </m:e>
+                                <m:sub>
+                                  <m:r>
+                                    <a:rPr lang="en-US" sz="1400" i="1">
+                                      <a:solidFill>
+                                        <a:schemeClr val="tx2">
+                                          <a:lumMod val="10000"/>
+                                        </a:schemeClr>
+                                      </a:solidFill>
+                                      <a:latin typeface="Cambria Math" panose="02040503050406030204" pitchFamily="18" charset="0"/>
+                                    </a:rPr>
+                                    <m:t>𝑣𝑚</m:t>
+                                  </m:r>
+                                </m:sub>
+                                <m:sup>
+                                  <m:r>
+                                    <a:rPr lang="en-US" sz="1400" i="1">
+                                      <a:solidFill>
+                                        <a:schemeClr val="tx2">
+                                          <a:lumMod val="10000"/>
+                                        </a:schemeClr>
+                                      </a:solidFill>
+                                      <a:latin typeface="Cambria Math" panose="02040503050406030204" pitchFamily="18" charset="0"/>
+                                    </a:rPr>
+                                    <m:t>𝑓𝑢𝑙𝑙</m:t>
+                                  </m:r>
+                                </m:sup>
+                              </m:sSubSup>
+                              <m:d>
+                                <m:dPr>
+                                  <m:ctrlPr>
+                                    <a:rPr lang="en-US" sz="1400" i="1">
+                                      <a:solidFill>
+                                        <a:schemeClr val="tx2">
+                                          <a:lumMod val="10000"/>
+                                        </a:schemeClr>
+                                      </a:solidFill>
+                                      <a:latin typeface="Cambria Math" panose="02040503050406030204" pitchFamily="18" charset="0"/>
+                                    </a:rPr>
+                                  </m:ctrlPr>
+                                </m:dPr>
+                                <m:e>
+                                  <m:r>
+                                    <a:rPr lang="en-US" sz="1400" i="1">
+                                      <a:solidFill>
+                                        <a:schemeClr val="tx2">
+                                          <a:lumMod val="10000"/>
+                                        </a:schemeClr>
+                                      </a:solidFill>
+                                      <a:latin typeface="Cambria Math" panose="02040503050406030204" pitchFamily="18" charset="0"/>
+                                    </a:rPr>
+                                    <m:t>𝑖</m:t>
+                                  </m:r>
+                                </m:e>
+                              </m:d>
+                            </m:e>
+                          </m:d>
+                          <m:r>
+                            <a:rPr lang="en-US" sz="1400" b="0" i="1" smtClean="0">
+                              <a:solidFill>
+                                <a:schemeClr val="tx2">
+                                  <a:lumMod val="10000"/>
+                                </a:schemeClr>
+                              </a:solidFill>
+                              <a:latin typeface="Cambria Math" panose="02040503050406030204" pitchFamily="18" charset="0"/>
+                            </a:rPr>
+                            <m:t>−</m:t>
+                          </m:r>
+                          <m:r>
+                            <a:rPr lang="en-US" sz="1400" b="0" i="1" smtClean="0">
+                              <a:solidFill>
+                                <a:schemeClr val="tx2">
+                                  <a:lumMod val="10000"/>
+                                </a:schemeClr>
+                              </a:solidFill>
+                              <a:latin typeface="Cambria Math" panose="02040503050406030204" pitchFamily="18" charset="0"/>
+                              <a:ea typeface="Cambria Math" panose="02040503050406030204" pitchFamily="18" charset="0"/>
+                            </a:rPr>
+                            <m:t>𝜀</m:t>
+                          </m:r>
+                          <m:r>
+                            <a:rPr lang="en-US" sz="1400" b="0" i="1" smtClean="0">
+                              <a:solidFill>
+                                <a:schemeClr val="tx2">
+                                  <a:lumMod val="10000"/>
+                                </a:schemeClr>
+                              </a:solidFill>
+                              <a:latin typeface="Cambria Math" panose="02040503050406030204" pitchFamily="18" charset="0"/>
+                            </a:rPr>
+                            <m:t>)</m:t>
+                          </m:r>
+                        </m:den>
+                      </m:f>
+                    </m:oMath>
+                  </m:oMathPara>
+                </a14:m>
+                <a:endParaRPr lang="en-US" sz="1400" dirty="0">
+                  <a:solidFill>
+                    <a:schemeClr val="tx2">
+                      <a:lumMod val="10000"/>
+                    </a:schemeClr>
+                  </a:solidFill>
+                </a:endParaRPr>
+              </a:p>
+            </p:txBody>
+          </p:sp>
+        </mc:Choice>
+        <mc:Fallback>
+          <p:sp>
+            <p:nvSpPr>
+              <p:cNvPr id="7" name="TextBox 6">
+                <a:extLst>
+                  <a:ext uri="{FF2B5EF4-FFF2-40B4-BE49-F238E27FC236}">
+                    <a16:creationId xmlns:a16="http://schemas.microsoft.com/office/drawing/2014/main" id="{A5D8D122-45F1-CFDF-77CC-BCE2EB37E480}"/>
+                  </a:ext>
+                </a:extLst>
+              </p:cNvPr>
+              <p:cNvSpPr txBox="1">
+                <a:spLocks noRot="1" noChangeAspect="1" noMove="1" noResize="1" noEditPoints="1" noAdjustHandles="1" noChangeArrowheads="1" noChangeShapeType="1" noTextEdit="1"/>
+              </p:cNvSpPr>
+              <p:nvPr/>
+            </p:nvSpPr>
+            <p:spPr>
+              <a:xfrm>
+                <a:off x="9663546" y="180725"/>
+                <a:ext cx="2357889" cy="561692"/>
+              </a:xfrm>
+              <a:prstGeom prst="rect">
+                <a:avLst/>
+              </a:prstGeom>
+              <a:blipFill>
+                <a:blip r:embed="rId4"/>
+                <a:stretch>
+                  <a:fillRect l="-1070" t="-2222" r="-1604" b="-11111"/>
+                </a:stretch>
+              </a:blipFill>
+            </p:spPr>
+            <p:txBody>
+              <a:bodyPr/>
+              <a:lstStyle/>
+              <a:p>
+                <a:r>
+                  <a:rPr lang="en-US">
+                    <a:noFill/>
+                  </a:rPr>
+                  <a:t> </a:t>
+                </a:r>
+              </a:p>
+            </p:txBody>
+          </p:sp>
+        </mc:Fallback>
+      </mc:AlternateContent>
+    </p:spTree>
+    <p:extLst>
+      <p:ext uri="{BB962C8B-B14F-4D97-AF65-F5344CB8AC3E}">
+        <p14:creationId xmlns:p14="http://schemas.microsoft.com/office/powerpoint/2010/main" val="2751966900"/>
       </p:ext>
     </p:extLst>
   </p:cSld>

</xml_diff>